<commit_message>
Citations and in line results
</commit_message>
<xml_diff>
--- a/Presentation.pptx
+++ b/Presentation.pptx
@@ -109,13 +109,18 @@
       </a:defRPr>
     </a:lvl9pPr>
   </p:defaultTextStyle>
+  <p:extLst>
+    <p:ext uri="{EFAFB233-063F-42B5-8137-9DF3F51BA10A}">
+      <p15:sldGuideLst xmlns:p15="http://schemas.microsoft.com/office/powerpoint/2012/main"/>
+    </p:ext>
+  </p:extLst>
 </p:presentation>
 </file>
 
 <file path=ppt/revisionInfo.xml><?xml version="1.0" encoding="utf-8"?>
 <p1510:revInfo xmlns:a="http://schemas.openxmlformats.org/drawingml/2006/main" xmlns:r="http://schemas.openxmlformats.org/officeDocument/2006/relationships" xmlns:p1510="http://schemas.microsoft.com/office/powerpoint/2015/10/main">
   <p1510:revLst>
-    <p1510:client id="{26C117A3-088F-42BC-AF31-F80722652034}" v="4" dt="2021-11-02T00:30:11.713"/>
+    <p1510:client id="{26C117A3-088F-42BC-AF31-F80722652034}" v="10" dt="2021-11-03T21:57:42.334"/>
   </p1510:revLst>
 </p1510:revInfo>
 </file>
@@ -125,7 +130,7 @@
   <pc:docChgLst>
     <pc:chgData name="Kelly Stellmacher" userId="72fafaaf-3c6a-43d6-be09-4d3837118c48" providerId="ADAL" clId="{26C117A3-088F-42BC-AF31-F80722652034}"/>
     <pc:docChg chg="undo custSel addSld delSld modSld">
-      <pc:chgData name="Kelly Stellmacher" userId="72fafaaf-3c6a-43d6-be09-4d3837118c48" providerId="ADAL" clId="{26C117A3-088F-42BC-AF31-F80722652034}" dt="2021-11-02T00:30:24.700" v="164" actId="20577"/>
+      <pc:chgData name="Kelly Stellmacher" userId="72fafaaf-3c6a-43d6-be09-4d3837118c48" providerId="ADAL" clId="{26C117A3-088F-42BC-AF31-F80722652034}" dt="2021-11-03T22:03:36.270" v="287" actId="1076"/>
       <pc:docMkLst>
         <pc:docMk/>
       </pc:docMkLst>
@@ -160,7 +165,7 @@
         </pc:sldMkLst>
       </pc:sldChg>
       <pc:sldChg chg="modSp new mod">
-        <pc:chgData name="Kelly Stellmacher" userId="72fafaaf-3c6a-43d6-be09-4d3837118c48" providerId="ADAL" clId="{26C117A3-088F-42BC-AF31-F80722652034}" dt="2021-11-02T00:28:48.869" v="91" actId="20577"/>
+        <pc:chgData name="Kelly Stellmacher" userId="72fafaaf-3c6a-43d6-be09-4d3837118c48" providerId="ADAL" clId="{26C117A3-088F-42BC-AF31-F80722652034}" dt="2021-11-03T21:54:14.569" v="167" actId="5793"/>
         <pc:sldMkLst>
           <pc:docMk/>
           <pc:sldMk cId="2559055149" sldId="258"/>
@@ -174,7 +179,7 @@
           </ac:spMkLst>
         </pc:spChg>
         <pc:spChg chg="mod">
-          <ac:chgData name="Kelly Stellmacher" userId="72fafaaf-3c6a-43d6-be09-4d3837118c48" providerId="ADAL" clId="{26C117A3-088F-42BC-AF31-F80722652034}" dt="2021-11-02T00:28:33.301" v="81" actId="1076"/>
+          <ac:chgData name="Kelly Stellmacher" userId="72fafaaf-3c6a-43d6-be09-4d3837118c48" providerId="ADAL" clId="{26C117A3-088F-42BC-AF31-F80722652034}" dt="2021-11-03T21:54:14.569" v="167" actId="5793"/>
           <ac:spMkLst>
             <pc:docMk/>
             <pc:sldMk cId="2559055149" sldId="258"/>
@@ -182,8 +187,8 @@
           </ac:spMkLst>
         </pc:spChg>
       </pc:sldChg>
-      <pc:sldChg chg="modSp add mod">
-        <pc:chgData name="Kelly Stellmacher" userId="72fafaaf-3c6a-43d6-be09-4d3837118c48" providerId="ADAL" clId="{26C117A3-088F-42BC-AF31-F80722652034}" dt="2021-11-02T00:29:20.513" v="119" actId="20577"/>
+      <pc:sldChg chg="addSp delSp modSp add mod">
+        <pc:chgData name="Kelly Stellmacher" userId="72fafaaf-3c6a-43d6-be09-4d3837118c48" providerId="ADAL" clId="{26C117A3-088F-42BC-AF31-F80722652034}" dt="2021-11-03T21:58:50.554" v="265" actId="1076"/>
         <pc:sldMkLst>
           <pc:docMk/>
           <pc:sldMk cId="643430349" sldId="259"/>
@@ -196,29 +201,101 @@
             <ac:spMk id="2" creationId="{916816B7-B84B-441C-BFCA-7FAFD918F548}"/>
           </ac:spMkLst>
         </pc:spChg>
+        <pc:spChg chg="del">
+          <ac:chgData name="Kelly Stellmacher" userId="72fafaaf-3c6a-43d6-be09-4d3837118c48" providerId="ADAL" clId="{26C117A3-088F-42BC-AF31-F80722652034}" dt="2021-11-03T21:54:33.760" v="168"/>
+          <ac:spMkLst>
+            <pc:docMk/>
+            <pc:sldMk cId="643430349" sldId="259"/>
+            <ac:spMk id="3" creationId="{101FFD2E-EAF3-4A37-B0EC-6612DC34F04D}"/>
+          </ac:spMkLst>
+        </pc:spChg>
+        <pc:spChg chg="add mod">
+          <ac:chgData name="Kelly Stellmacher" userId="72fafaaf-3c6a-43d6-be09-4d3837118c48" providerId="ADAL" clId="{26C117A3-088F-42BC-AF31-F80722652034}" dt="2021-11-03T21:58:50.554" v="265" actId="1076"/>
+          <ac:spMkLst>
+            <pc:docMk/>
+            <pc:sldMk cId="643430349" sldId="259"/>
+            <ac:spMk id="10" creationId="{669A90E6-37F0-4E05-AE76-2D1AEAE58F35}"/>
+          </ac:spMkLst>
+        </pc:spChg>
+        <pc:spChg chg="add mod">
+          <ac:chgData name="Kelly Stellmacher" userId="72fafaaf-3c6a-43d6-be09-4d3837118c48" providerId="ADAL" clId="{26C117A3-088F-42BC-AF31-F80722652034}" dt="2021-11-03T21:58:43.594" v="264" actId="1076"/>
+          <ac:spMkLst>
+            <pc:docMk/>
+            <pc:sldMk cId="643430349" sldId="259"/>
+            <ac:spMk id="11" creationId="{087858B6-02AF-4C05-9AD5-2C64E048611B}"/>
+          </ac:spMkLst>
+        </pc:spChg>
+        <pc:spChg chg="add mod">
+          <ac:chgData name="Kelly Stellmacher" userId="72fafaaf-3c6a-43d6-be09-4d3837118c48" providerId="ADAL" clId="{26C117A3-088F-42BC-AF31-F80722652034}" dt="2021-11-03T21:58:36.187" v="262" actId="1076"/>
+          <ac:spMkLst>
+            <pc:docMk/>
+            <pc:sldMk cId="643430349" sldId="259"/>
+            <ac:spMk id="12" creationId="{1FA682F5-8FE5-44A8-9790-7D4066CED2D9}"/>
+          </ac:spMkLst>
+        </pc:spChg>
+        <pc:picChg chg="add mod">
+          <ac:chgData name="Kelly Stellmacher" userId="72fafaaf-3c6a-43d6-be09-4d3837118c48" providerId="ADAL" clId="{26C117A3-088F-42BC-AF31-F80722652034}" dt="2021-11-03T21:58:50.554" v="265" actId="1076"/>
+          <ac:picMkLst>
+            <pc:docMk/>
+            <pc:sldMk cId="643430349" sldId="259"/>
+            <ac:picMk id="5" creationId="{D5233335-6F54-406B-B066-E442428A4E45}"/>
+          </ac:picMkLst>
+        </pc:picChg>
+        <pc:picChg chg="add mod modCrop">
+          <ac:chgData name="Kelly Stellmacher" userId="72fafaaf-3c6a-43d6-be09-4d3837118c48" providerId="ADAL" clId="{26C117A3-088F-42BC-AF31-F80722652034}" dt="2021-11-03T21:58:36.187" v="262" actId="1076"/>
+          <ac:picMkLst>
+            <pc:docMk/>
+            <pc:sldMk cId="643430349" sldId="259"/>
+            <ac:picMk id="7" creationId="{4D75F32D-17D4-4808-970E-597FF1A677CB}"/>
+          </ac:picMkLst>
+        </pc:picChg>
+        <pc:picChg chg="add mod">
+          <ac:chgData name="Kelly Stellmacher" userId="72fafaaf-3c6a-43d6-be09-4d3837118c48" providerId="ADAL" clId="{26C117A3-088F-42BC-AF31-F80722652034}" dt="2021-11-03T21:58:43.594" v="264" actId="1076"/>
+          <ac:picMkLst>
+            <pc:docMk/>
+            <pc:sldMk cId="643430349" sldId="259"/>
+            <ac:picMk id="9" creationId="{F9AF8367-7534-4D1D-8979-A0AF4B12727F}"/>
+          </ac:picMkLst>
+        </pc:picChg>
       </pc:sldChg>
-      <pc:sldChg chg="modSp new mod">
-        <pc:chgData name="Kelly Stellmacher" userId="72fafaaf-3c6a-43d6-be09-4d3837118c48" providerId="ADAL" clId="{26C117A3-088F-42BC-AF31-F80722652034}" dt="2021-11-02T00:29:53.928" v="137" actId="20577"/>
+      <pc:sldChg chg="addSp delSp modSp new mod">
+        <pc:chgData name="Kelly Stellmacher" userId="72fafaaf-3c6a-43d6-be09-4d3837118c48" providerId="ADAL" clId="{26C117A3-088F-42BC-AF31-F80722652034}" dt="2021-11-03T22:03:36.270" v="287" actId="1076"/>
         <pc:sldMkLst>
           <pc:docMk/>
           <pc:sldMk cId="1741576544" sldId="260"/>
         </pc:sldMkLst>
         <pc:spChg chg="mod">
-          <ac:chgData name="Kelly Stellmacher" userId="72fafaaf-3c6a-43d6-be09-4d3837118c48" providerId="ADAL" clId="{26C117A3-088F-42BC-AF31-F80722652034}" dt="2021-11-02T00:29:53.928" v="137" actId="20577"/>
+          <ac:chgData name="Kelly Stellmacher" userId="72fafaaf-3c6a-43d6-be09-4d3837118c48" providerId="ADAL" clId="{26C117A3-088F-42BC-AF31-F80722652034}" dt="2021-11-03T22:03:36.270" v="287" actId="1076"/>
           <ac:spMkLst>
             <pc:docMk/>
             <pc:sldMk cId="1741576544" sldId="260"/>
             <ac:spMk id="2" creationId="{E8522C48-3748-4C93-A28D-4BDBE5CB90D7}"/>
           </ac:spMkLst>
         </pc:spChg>
-        <pc:spChg chg="mod">
-          <ac:chgData name="Kelly Stellmacher" userId="72fafaaf-3c6a-43d6-be09-4d3837118c48" providerId="ADAL" clId="{26C117A3-088F-42BC-AF31-F80722652034}" dt="2021-11-02T00:29:42.373" v="124" actId="1076"/>
+        <pc:spChg chg="del mod">
+          <ac:chgData name="Kelly Stellmacher" userId="72fafaaf-3c6a-43d6-be09-4d3837118c48" providerId="ADAL" clId="{26C117A3-088F-42BC-AF31-F80722652034}" dt="2021-11-03T21:59:59.024" v="268" actId="22"/>
           <ac:spMkLst>
             <pc:docMk/>
             <pc:sldMk cId="1741576544" sldId="260"/>
             <ac:spMk id="3" creationId="{2C7766DE-150D-4187-A427-2951149FFB7D}"/>
           </ac:spMkLst>
         </pc:spChg>
+        <pc:picChg chg="add mod ord">
+          <ac:chgData name="Kelly Stellmacher" userId="72fafaaf-3c6a-43d6-be09-4d3837118c48" providerId="ADAL" clId="{26C117A3-088F-42BC-AF31-F80722652034}" dt="2021-11-03T22:03:09.094" v="284" actId="1440"/>
+          <ac:picMkLst>
+            <pc:docMk/>
+            <pc:sldMk cId="1741576544" sldId="260"/>
+            <ac:picMk id="5" creationId="{DEB8EC44-AA7E-4E0E-A7FC-1839EF56A381}"/>
+          </ac:picMkLst>
+        </pc:picChg>
+        <pc:picChg chg="add mod">
+          <ac:chgData name="Kelly Stellmacher" userId="72fafaaf-3c6a-43d6-be09-4d3837118c48" providerId="ADAL" clId="{26C117A3-088F-42BC-AF31-F80722652034}" dt="2021-11-03T22:03:15.102" v="285" actId="1076"/>
+          <ac:picMkLst>
+            <pc:docMk/>
+            <pc:sldMk cId="1741576544" sldId="260"/>
+            <ac:picMk id="7" creationId="{D5B44EAB-F702-43CC-BB59-E34973A3C8BF}"/>
+          </ac:picMkLst>
+        </pc:picChg>
       </pc:sldChg>
       <pc:sldChg chg="modSp add mod">
         <pc:chgData name="Kelly Stellmacher" userId="72fafaaf-3c6a-43d6-be09-4d3837118c48" providerId="ADAL" clId="{26C117A3-088F-42BC-AF31-F80722652034}" dt="2021-11-02T00:30:02.276" v="151" actId="20577"/>
@@ -462,7 +539,7 @@
           <a:p>
             <a:fld id="{AA90B4F7-47C7-4DDC-8EF1-CE8BF623A236}" type="datetimeFigureOut">
               <a:rPr lang="en-US" smtClean="0"/>
-              <a:t>11/1/2021</a:t>
+              <a:t>11/3/2021</a:t>
             </a:fld>
             <a:endParaRPr lang="en-US"/>
           </a:p>
@@ -898,7 +975,7 @@
           <a:p>
             <a:fld id="{AA90B4F7-47C7-4DDC-8EF1-CE8BF623A236}" type="datetimeFigureOut">
               <a:rPr lang="en-US" smtClean="0"/>
-              <a:t>11/1/2021</a:t>
+              <a:t>11/3/2021</a:t>
             </a:fld>
             <a:endParaRPr lang="en-US"/>
           </a:p>
@@ -1148,7 +1225,7 @@
           <a:p>
             <a:fld id="{AA90B4F7-47C7-4DDC-8EF1-CE8BF623A236}" type="datetimeFigureOut">
               <a:rPr lang="en-US" smtClean="0"/>
-              <a:t>11/1/2021</a:t>
+              <a:t>11/3/2021</a:t>
             </a:fld>
             <a:endParaRPr lang="en-US"/>
           </a:p>
@@ -1456,7 +1533,7 @@
           <a:p>
             <a:fld id="{AA90B4F7-47C7-4DDC-8EF1-CE8BF623A236}" type="datetimeFigureOut">
               <a:rPr lang="en-US" smtClean="0"/>
-              <a:t>11/1/2021</a:t>
+              <a:t>11/3/2021</a:t>
             </a:fld>
             <a:endParaRPr lang="en-US"/>
           </a:p>
@@ -1774,7 +1851,7 @@
           <a:p>
             <a:fld id="{AA90B4F7-47C7-4DDC-8EF1-CE8BF623A236}" type="datetimeFigureOut">
               <a:rPr lang="en-US" smtClean="0"/>
-              <a:t>11/1/2021</a:t>
+              <a:t>11/3/2021</a:t>
             </a:fld>
             <a:endParaRPr lang="en-US"/>
           </a:p>
@@ -2076,7 +2153,7 @@
           <a:p>
             <a:fld id="{AA90B4F7-47C7-4DDC-8EF1-CE8BF623A236}" type="datetimeFigureOut">
               <a:rPr lang="en-US" smtClean="0"/>
-              <a:t>11/1/2021</a:t>
+              <a:t>11/3/2021</a:t>
             </a:fld>
             <a:endParaRPr lang="en-US"/>
           </a:p>
@@ -2443,7 +2520,7 @@
           <a:p>
             <a:fld id="{AA90B4F7-47C7-4DDC-8EF1-CE8BF623A236}" type="datetimeFigureOut">
               <a:rPr lang="en-US" smtClean="0"/>
-              <a:t>11/1/2021</a:t>
+              <a:t>11/3/2021</a:t>
             </a:fld>
             <a:endParaRPr lang="en-US"/>
           </a:p>
@@ -2617,7 +2694,7 @@
           <a:p>
             <a:fld id="{AA90B4F7-47C7-4DDC-8EF1-CE8BF623A236}" type="datetimeFigureOut">
               <a:rPr lang="en-US" smtClean="0"/>
-              <a:t>11/1/2021</a:t>
+              <a:t>11/3/2021</a:t>
             </a:fld>
             <a:endParaRPr lang="en-US"/>
           </a:p>
@@ -2797,7 +2874,7 @@
           <a:p>
             <a:fld id="{AA90B4F7-47C7-4DDC-8EF1-CE8BF623A236}" type="datetimeFigureOut">
               <a:rPr lang="en-US" smtClean="0"/>
-              <a:t>11/1/2021</a:t>
+              <a:t>11/3/2021</a:t>
             </a:fld>
             <a:endParaRPr lang="en-US"/>
           </a:p>
@@ -2967,7 +3044,7 @@
           <a:p>
             <a:fld id="{AA90B4F7-47C7-4DDC-8EF1-CE8BF623A236}" type="datetimeFigureOut">
               <a:rPr lang="en-US" smtClean="0"/>
-              <a:t>11/1/2021</a:t>
+              <a:t>11/3/2021</a:t>
             </a:fld>
             <a:endParaRPr lang="en-US"/>
           </a:p>
@@ -3217,7 +3294,7 @@
           <a:p>
             <a:fld id="{AA90B4F7-47C7-4DDC-8EF1-CE8BF623A236}" type="datetimeFigureOut">
               <a:rPr lang="en-US" smtClean="0"/>
-              <a:t>11/1/2021</a:t>
+              <a:t>11/3/2021</a:t>
             </a:fld>
             <a:endParaRPr lang="en-US"/>
           </a:p>
@@ -3453,7 +3530,7 @@
           <a:p>
             <a:fld id="{AA90B4F7-47C7-4DDC-8EF1-CE8BF623A236}" type="datetimeFigureOut">
               <a:rPr lang="en-US" smtClean="0"/>
-              <a:t>11/1/2021</a:t>
+              <a:t>11/3/2021</a:t>
             </a:fld>
             <a:endParaRPr lang="en-US"/>
           </a:p>
@@ -3835,7 +3912,7 @@
           <a:p>
             <a:fld id="{AA90B4F7-47C7-4DDC-8EF1-CE8BF623A236}" type="datetimeFigureOut">
               <a:rPr lang="en-US" smtClean="0"/>
-              <a:t>11/1/2021</a:t>
+              <a:t>11/3/2021</a:t>
             </a:fld>
             <a:endParaRPr lang="en-US"/>
           </a:p>
@@ -3953,7 +4030,7 @@
           <a:p>
             <a:fld id="{AA90B4F7-47C7-4DDC-8EF1-CE8BF623A236}" type="datetimeFigureOut">
               <a:rPr lang="en-US" smtClean="0"/>
-              <a:t>11/1/2021</a:t>
+              <a:t>11/3/2021</a:t>
             </a:fld>
             <a:endParaRPr lang="en-US"/>
           </a:p>
@@ -4048,7 +4125,7 @@
           <a:p>
             <a:fld id="{AA90B4F7-47C7-4DDC-8EF1-CE8BF623A236}" type="datetimeFigureOut">
               <a:rPr lang="en-US" smtClean="0"/>
-              <a:t>11/1/2021</a:t>
+              <a:t>11/3/2021</a:t>
             </a:fld>
             <a:endParaRPr lang="en-US"/>
           </a:p>
@@ -4303,7 +4380,7 @@
           <a:p>
             <a:fld id="{AA90B4F7-47C7-4DDC-8EF1-CE8BF623A236}" type="datetimeFigureOut">
               <a:rPr lang="en-US" smtClean="0"/>
-              <a:t>11/1/2021</a:t>
+              <a:t>11/3/2021</a:t>
             </a:fld>
             <a:endParaRPr lang="en-US"/>
           </a:p>
@@ -4586,7 +4663,7 @@
           <a:p>
             <a:fld id="{AA90B4F7-47C7-4DDC-8EF1-CE8BF623A236}" type="datetimeFigureOut">
               <a:rPr lang="en-US" smtClean="0"/>
-              <a:t>11/1/2021</a:t>
+              <a:t>11/3/2021</a:t>
             </a:fld>
             <a:endParaRPr lang="en-US"/>
           </a:p>
@@ -4992,7 +5069,7 @@
           <a:p>
             <a:fld id="{AA90B4F7-47C7-4DDC-8EF1-CE8BF623A236}" type="datetimeFigureOut">
               <a:rPr lang="en-US" smtClean="0"/>
-              <a:t>11/1/2021</a:t>
+              <a:t>11/3/2021</a:t>
             </a:fld>
             <a:endParaRPr lang="en-US"/>
           </a:p>
@@ -5679,6 +5756,21 @@
           <a:bodyPr/>
           <a:lstStyle/>
           <a:p>
+            <a:pPr marL="0" indent="0">
+              <a:buNone/>
+            </a:pPr>
+            <a:r>
+              <a:rPr lang="en-US" sz="4000" b="0" i="0" dirty="0">
+                <a:solidFill>
+                  <a:srgbClr val="000000"/>
+                </a:solidFill>
+                <a:effectLst/>
+                <a:latin typeface="Helvetica" panose="020B0604020202020204" pitchFamily="34" charset="0"/>
+              </a:rPr>
+              <a:t>What thickness of insulation in a solar house in Columbus, Ohio during Winter would maintain a minimum internal temperature over time?</a:t>
+            </a:r>
+          </a:p>
+          <a:p>
             <a:endParaRPr lang="en-US" dirty="0"/>
           </a:p>
         </p:txBody>
@@ -5746,33 +5838,271 @@
           </a:p>
         </p:txBody>
       </p:sp>
-      <p:sp>
-        <p:nvSpPr>
-          <p:cNvPr id="3" name="Content Placeholder 2">
+      <p:pic>
+        <p:nvPicPr>
+          <p:cNvPr id="5" name="Content Placeholder 4" descr="Diagram, text&#10;&#10;Description automatically generated">
             <a:extLst>
               <a:ext uri="{FF2B5EF4-FFF2-40B4-BE49-F238E27FC236}">
-                <a16:creationId xmlns:a16="http://schemas.microsoft.com/office/drawing/2014/main" id="{101FFD2E-EAF3-4A37-B0EC-6612DC34F04D}"/>
+                <a16:creationId xmlns:a16="http://schemas.microsoft.com/office/drawing/2014/main" id="{D5233335-6F54-406B-B066-E442428A4E45}"/>
               </a:ext>
             </a:extLst>
           </p:cNvPr>
-          <p:cNvSpPr>
-            <a:spLocks noGrp="1"/>
-          </p:cNvSpPr>
+          <p:cNvPicPr>
+            <a:picLocks noGrp="1" noChangeAspect="1"/>
+          </p:cNvPicPr>
           <p:nvPr>
             <p:ph idx="1"/>
           </p:nvPr>
-        </p:nvSpPr>
+        </p:nvPicPr>
+        <p:blipFill>
+          <a:blip r:embed="rId2">
+            <a:extLst>
+              <a:ext uri="{28A0092B-C50C-407E-A947-70E740481C1C}">
+                <a14:useLocalDpi xmlns:a14="http://schemas.microsoft.com/office/drawing/2010/main" val="0"/>
+              </a:ext>
+            </a:extLst>
+          </a:blip>
+          <a:stretch>
+            <a:fillRect/>
+          </a:stretch>
+        </p:blipFill>
         <p:spPr>
           <a:xfrm>
-            <a:off x="684212" y="1975586"/>
-            <a:ext cx="8534400" cy="3615267"/>
+            <a:off x="742106" y="4688336"/>
+            <a:ext cx="7086623" cy="2008153"/>
           </a:xfrm>
+          <a:prstGeom prst="rect">
+            <a:avLst/>
+          </a:prstGeom>
+          <a:ln w="38100" cap="sq">
+            <a:solidFill>
+              <a:srgbClr val="000000"/>
+            </a:solidFill>
+            <a:prstDash val="solid"/>
+            <a:miter lim="800000"/>
+          </a:ln>
+          <a:effectLst>
+            <a:outerShdw blurRad="50800" dist="38100" dir="2700000" algn="tl" rotWithShape="0">
+              <a:srgbClr val="000000">
+                <a:alpha val="43000"/>
+              </a:srgbClr>
+            </a:outerShdw>
+          </a:effectLst>
         </p:spPr>
-        <p:txBody>
-          <a:bodyPr/>
-          <a:lstStyle/>
-          <a:p>
-            <a:endParaRPr lang="en-US" dirty="0"/>
+      </p:pic>
+      <p:pic>
+        <p:nvPicPr>
+          <p:cNvPr id="7" name="Picture 6" descr="Text, letter&#10;&#10;Description automatically generated">
+            <a:extLst>
+              <a:ext uri="{FF2B5EF4-FFF2-40B4-BE49-F238E27FC236}">
+                <a16:creationId xmlns:a16="http://schemas.microsoft.com/office/drawing/2014/main" id="{4D75F32D-17D4-4808-970E-597FF1A677CB}"/>
+              </a:ext>
+            </a:extLst>
+          </p:cNvPr>
+          <p:cNvPicPr>
+            <a:picLocks noChangeAspect="1"/>
+          </p:cNvPicPr>
+          <p:nvPr/>
+        </p:nvPicPr>
+        <p:blipFill rotWithShape="1">
+          <a:blip r:embed="rId3">
+            <a:extLst>
+              <a:ext uri="{28A0092B-C50C-407E-A947-70E740481C1C}">
+                <a14:useLocalDpi xmlns:a14="http://schemas.microsoft.com/office/drawing/2010/main" val="0"/>
+              </a:ext>
+            </a:extLst>
+          </a:blip>
+          <a:srcRect t="25884" b="7213"/>
+          <a:stretch/>
+        </p:blipFill>
+        <p:spPr>
+          <a:xfrm>
+            <a:off x="6594663" y="2136702"/>
+            <a:ext cx="5247897" cy="1836765"/>
+          </a:xfrm>
+          <a:prstGeom prst="rect">
+            <a:avLst/>
+          </a:prstGeom>
+          <a:ln w="38100" cap="sq">
+            <a:solidFill>
+              <a:srgbClr val="000000"/>
+            </a:solidFill>
+            <a:prstDash val="solid"/>
+            <a:miter lim="800000"/>
+          </a:ln>
+          <a:effectLst>
+            <a:outerShdw blurRad="50800" dist="38100" dir="2700000" algn="tl" rotWithShape="0">
+              <a:srgbClr val="000000">
+                <a:alpha val="43000"/>
+              </a:srgbClr>
+            </a:outerShdw>
+          </a:effectLst>
+        </p:spPr>
+      </p:pic>
+      <p:pic>
+        <p:nvPicPr>
+          <p:cNvPr id="9" name="Picture 8" descr="Diagram&#10;&#10;Description automatically generated">
+            <a:extLst>
+              <a:ext uri="{FF2B5EF4-FFF2-40B4-BE49-F238E27FC236}">
+                <a16:creationId xmlns:a16="http://schemas.microsoft.com/office/drawing/2014/main" id="{F9AF8367-7534-4D1D-8979-A0AF4B12727F}"/>
+              </a:ext>
+            </a:extLst>
+          </p:cNvPr>
+          <p:cNvPicPr>
+            <a:picLocks noChangeAspect="1"/>
+          </p:cNvPicPr>
+          <p:nvPr/>
+        </p:nvPicPr>
+        <p:blipFill>
+          <a:blip r:embed="rId4">
+            <a:extLst>
+              <a:ext uri="{28A0092B-C50C-407E-A947-70E740481C1C}">
+                <a14:useLocalDpi xmlns:a14="http://schemas.microsoft.com/office/drawing/2010/main" val="0"/>
+              </a:ext>
+            </a:extLst>
+          </a:blip>
+          <a:stretch>
+            <a:fillRect/>
+          </a:stretch>
+        </p:blipFill>
+        <p:spPr>
+          <a:xfrm>
+            <a:off x="485460" y="1643780"/>
+            <a:ext cx="4975856" cy="2334440"/>
+          </a:xfrm>
+          <a:prstGeom prst="rect">
+            <a:avLst/>
+          </a:prstGeom>
+          <a:ln w="38100" cap="sq">
+            <a:solidFill>
+              <a:srgbClr val="000000"/>
+            </a:solidFill>
+            <a:prstDash val="solid"/>
+            <a:miter lim="800000"/>
+          </a:ln>
+          <a:effectLst>
+            <a:outerShdw blurRad="50800" dist="38100" dir="2700000" algn="tl" rotWithShape="0">
+              <a:srgbClr val="000000">
+                <a:alpha val="43000"/>
+              </a:srgbClr>
+            </a:outerShdw>
+          </a:effectLst>
+        </p:spPr>
+      </p:pic>
+      <p:sp>
+        <p:nvSpPr>
+          <p:cNvPr id="10" name="TextBox 9">
+            <a:extLst>
+              <a:ext uri="{FF2B5EF4-FFF2-40B4-BE49-F238E27FC236}">
+                <a16:creationId xmlns:a16="http://schemas.microsoft.com/office/drawing/2014/main" id="{669A90E6-37F0-4E05-AE76-2D1AEAE58F35}"/>
+              </a:ext>
+            </a:extLst>
+          </p:cNvPr>
+          <p:cNvSpPr txBox="1"/>
+          <p:nvPr/>
+        </p:nvSpPr>
+        <p:spPr>
+          <a:xfrm>
+            <a:off x="684212" y="4210142"/>
+            <a:ext cx="4028364" cy="369332"/>
+          </a:xfrm>
+          <a:prstGeom prst="rect">
+            <a:avLst/>
+          </a:prstGeom>
+          <a:noFill/>
+        </p:spPr>
+        <p:txBody>
+          <a:bodyPr wrap="square" rtlCol="0">
+            <a:spAutoFit/>
+          </a:bodyPr>
+          <a:lstStyle/>
+          <a:p>
+            <a:r>
+              <a:rPr lang="en-US" dirty="0">
+                <a:solidFill>
+                  <a:schemeClr val="bg1"/>
+                </a:solidFill>
+              </a:rPr>
+              <a:t>Stock and Flow Diagram:</a:t>
+            </a:r>
+          </a:p>
+        </p:txBody>
+      </p:sp>
+      <p:sp>
+        <p:nvSpPr>
+          <p:cNvPr id="11" name="TextBox 10">
+            <a:extLst>
+              <a:ext uri="{FF2B5EF4-FFF2-40B4-BE49-F238E27FC236}">
+                <a16:creationId xmlns:a16="http://schemas.microsoft.com/office/drawing/2014/main" id="{087858B6-02AF-4C05-9AD5-2C64E048611B}"/>
+              </a:ext>
+            </a:extLst>
+          </p:cNvPr>
+          <p:cNvSpPr txBox="1"/>
+          <p:nvPr/>
+        </p:nvSpPr>
+        <p:spPr>
+          <a:xfrm>
+            <a:off x="485460" y="1165587"/>
+            <a:ext cx="2197289" cy="369332"/>
+          </a:xfrm>
+          <a:prstGeom prst="rect">
+            <a:avLst/>
+          </a:prstGeom>
+          <a:noFill/>
+        </p:spPr>
+        <p:txBody>
+          <a:bodyPr wrap="square" rtlCol="0">
+            <a:spAutoFit/>
+          </a:bodyPr>
+          <a:lstStyle/>
+          <a:p>
+            <a:r>
+              <a:rPr lang="en-US" dirty="0">
+                <a:solidFill>
+                  <a:schemeClr val="bg1"/>
+                </a:solidFill>
+              </a:rPr>
+              <a:t>Schematic:</a:t>
+            </a:r>
+          </a:p>
+        </p:txBody>
+      </p:sp>
+      <p:sp>
+        <p:nvSpPr>
+          <p:cNvPr id="12" name="TextBox 11">
+            <a:extLst>
+              <a:ext uri="{FF2B5EF4-FFF2-40B4-BE49-F238E27FC236}">
+                <a16:creationId xmlns:a16="http://schemas.microsoft.com/office/drawing/2014/main" id="{1FA682F5-8FE5-44A8-9790-7D4066CED2D9}"/>
+              </a:ext>
+            </a:extLst>
+          </p:cNvPr>
+          <p:cNvSpPr txBox="1"/>
+          <p:nvPr/>
+        </p:nvSpPr>
+        <p:spPr>
+          <a:xfrm>
+            <a:off x="6505502" y="1643780"/>
+            <a:ext cx="2335966" cy="369332"/>
+          </a:xfrm>
+          <a:prstGeom prst="rect">
+            <a:avLst/>
+          </a:prstGeom>
+          <a:noFill/>
+        </p:spPr>
+        <p:txBody>
+          <a:bodyPr wrap="square" rtlCol="0">
+            <a:spAutoFit/>
+          </a:bodyPr>
+          <a:lstStyle/>
+          <a:p>
+            <a:r>
+              <a:rPr lang="en-US" dirty="0">
+                <a:solidFill>
+                  <a:schemeClr val="bg1"/>
+                </a:solidFill>
+              </a:rPr>
+              <a:t>Equations:</a:t>
+            </a:r>
           </a:p>
         </p:txBody>
       </p:sp>
@@ -5824,7 +6154,7 @@
         </p:nvSpPr>
         <p:spPr>
           <a:xfrm>
-            <a:off x="684212" y="300790"/>
+            <a:off x="190273" y="41596"/>
             <a:ext cx="8534400" cy="1507067"/>
           </a:xfrm>
         </p:spPr>
@@ -5839,36 +6169,96 @@
           </a:p>
         </p:txBody>
       </p:sp>
-      <p:sp>
-        <p:nvSpPr>
-          <p:cNvPr id="3" name="Content Placeholder 2">
+      <p:pic>
+        <p:nvPicPr>
+          <p:cNvPr id="5" name="Content Placeholder 4">
             <a:extLst>
               <a:ext uri="{FF2B5EF4-FFF2-40B4-BE49-F238E27FC236}">
-                <a16:creationId xmlns:a16="http://schemas.microsoft.com/office/drawing/2014/main" id="{2C7766DE-150D-4187-A427-2951149FFB7D}"/>
+                <a16:creationId xmlns:a16="http://schemas.microsoft.com/office/drawing/2014/main" id="{DEB8EC44-AA7E-4E0E-A7FC-1839EF56A381}"/>
               </a:ext>
             </a:extLst>
           </p:cNvPr>
-          <p:cNvSpPr>
-            <a:spLocks noGrp="1"/>
-          </p:cNvSpPr>
+          <p:cNvPicPr>
+            <a:picLocks noGrp="1" noChangeAspect="1"/>
+          </p:cNvPicPr>
           <p:nvPr>
             <p:ph idx="1"/>
           </p:nvPr>
-        </p:nvSpPr>
+        </p:nvPicPr>
+        <p:blipFill>
+          <a:blip r:embed="rId2"/>
+          <a:stretch>
+            <a:fillRect/>
+          </a:stretch>
+        </p:blipFill>
         <p:spPr>
           <a:xfrm>
-            <a:off x="684212" y="1898584"/>
-            <a:ext cx="8534400" cy="3615267"/>
+            <a:off x="7734528" y="3531708"/>
+            <a:ext cx="3973426" cy="3025502"/>
           </a:xfrm>
+          <a:prstGeom prst="rect">
+            <a:avLst/>
+          </a:prstGeom>
+          <a:ln w="38100" cap="sq">
+            <a:solidFill>
+              <a:srgbClr val="000000"/>
+            </a:solidFill>
+            <a:prstDash val="solid"/>
+            <a:miter lim="800000"/>
+          </a:ln>
+          <a:effectLst>
+            <a:outerShdw blurRad="50800" dist="38100" dir="2700000" algn="tl" rotWithShape="0">
+              <a:srgbClr val="000000">
+                <a:alpha val="43000"/>
+              </a:srgbClr>
+            </a:outerShdw>
+          </a:effectLst>
         </p:spPr>
-        <p:txBody>
-          <a:bodyPr/>
-          <a:lstStyle/>
-          <a:p>
-            <a:endParaRPr lang="en-US" dirty="0"/>
-          </a:p>
-        </p:txBody>
-      </p:sp>
+      </p:pic>
+      <p:pic>
+        <p:nvPicPr>
+          <p:cNvPr id="7" name="Picture 6">
+            <a:extLst>
+              <a:ext uri="{FF2B5EF4-FFF2-40B4-BE49-F238E27FC236}">
+                <a16:creationId xmlns:a16="http://schemas.microsoft.com/office/drawing/2014/main" id="{D5B44EAB-F702-43CC-BB59-E34973A3C8BF}"/>
+              </a:ext>
+            </a:extLst>
+          </p:cNvPr>
+          <p:cNvPicPr>
+            <a:picLocks noChangeAspect="1"/>
+          </p:cNvPicPr>
+          <p:nvPr/>
+        </p:nvPicPr>
+        <p:blipFill>
+          <a:blip r:embed="rId3"/>
+          <a:stretch>
+            <a:fillRect/>
+          </a:stretch>
+        </p:blipFill>
+        <p:spPr>
+          <a:xfrm>
+            <a:off x="7734528" y="247012"/>
+            <a:ext cx="3973426" cy="3079280"/>
+          </a:xfrm>
+          <a:prstGeom prst="rect">
+            <a:avLst/>
+          </a:prstGeom>
+          <a:ln w="38100" cap="sq">
+            <a:solidFill>
+              <a:srgbClr val="000000"/>
+            </a:solidFill>
+            <a:prstDash val="solid"/>
+            <a:miter lim="800000"/>
+          </a:ln>
+          <a:effectLst>
+            <a:outerShdw blurRad="50800" dist="38100" dir="2700000" algn="tl" rotWithShape="0">
+              <a:srgbClr val="000000">
+                <a:alpha val="43000"/>
+              </a:srgbClr>
+            </a:outerShdw>
+          </a:effectLst>
+        </p:spPr>
+      </p:pic>
     </p:spTree>
     <p:extLst>
       <p:ext uri="{BB962C8B-B14F-4D97-AF65-F5344CB8AC3E}">

</xml_diff>

<commit_message>
almost done, just discuss interpretation and assign slides later
</commit_message>
<xml_diff>
--- a/Presentation.pptx
+++ b/Presentation.pptx
@@ -110,6 +110,24 @@
     </a:lvl9pPr>
   </p:defaultTextStyle>
   <p:extLst>
+    <p:ext uri="{521415D9-36F7-43E2-AB2F-B90AF26B5E84}">
+      <p14:sectionLst xmlns:p14="http://schemas.microsoft.com/office/powerpoint/2010/main">
+        <p14:section name="Default Section" id="{F0980628-2824-4908-8227-B6DF9DD2E4B0}">
+          <p14:sldIdLst>
+            <p14:sldId id="256"/>
+            <p14:sldId id="258"/>
+            <p14:sldId id="259"/>
+          </p14:sldIdLst>
+        </p14:section>
+        <p14:section name="Untitled Section" id="{6D0EE2CB-C83E-44C4-8F1F-8C867FC99D24}">
+          <p14:sldIdLst>
+            <p14:sldId id="260"/>
+            <p14:sldId id="261"/>
+            <p14:sldId id="262"/>
+          </p14:sldIdLst>
+        </p14:section>
+      </p14:sectionLst>
+    </p:ext>
     <p:ext uri="{EFAFB233-063F-42B5-8137-9DF3F51BA10A}">
       <p15:sldGuideLst xmlns:p15="http://schemas.microsoft.com/office/powerpoint/2012/main"/>
     </p:ext>
@@ -120,7 +138,7 @@
 <file path=ppt/revisionInfo.xml><?xml version="1.0" encoding="utf-8"?>
 <p1510:revInfo xmlns:a="http://schemas.openxmlformats.org/drawingml/2006/main" xmlns:r="http://schemas.openxmlformats.org/officeDocument/2006/relationships" xmlns:p1510="http://schemas.microsoft.com/office/powerpoint/2015/10/main">
   <p1510:revLst>
-    <p1510:client id="{26C117A3-088F-42BC-AF31-F80722652034}" v="10" dt="2021-11-03T21:57:42.334"/>
+    <p1510:client id="{26C117A3-088F-42BC-AF31-F80722652034}" v="11" dt="2021-11-03T23:06:20.100"/>
   </p1510:revLst>
 </p1510:revInfo>
 </file>
@@ -129,8 +147,8 @@
 <pc:chgInfo xmlns:a="http://schemas.openxmlformats.org/drawingml/2006/main" xmlns:r="http://schemas.openxmlformats.org/officeDocument/2006/relationships" xmlns:ac="http://schemas.microsoft.com/office/drawing/2013/main/command" xmlns:pc="http://schemas.microsoft.com/office/powerpoint/2013/main/command">
   <pc:docChgLst>
     <pc:chgData name="Kelly Stellmacher" userId="72fafaaf-3c6a-43d6-be09-4d3837118c48" providerId="ADAL" clId="{26C117A3-088F-42BC-AF31-F80722652034}"/>
-    <pc:docChg chg="undo custSel addSld delSld modSld">
-      <pc:chgData name="Kelly Stellmacher" userId="72fafaaf-3c6a-43d6-be09-4d3837118c48" providerId="ADAL" clId="{26C117A3-088F-42BC-AF31-F80722652034}" dt="2021-11-03T22:03:36.270" v="287" actId="1076"/>
+    <pc:docChg chg="undo custSel addSld delSld modSld addSection">
+      <pc:chgData name="Kelly Stellmacher" userId="72fafaaf-3c6a-43d6-be09-4d3837118c48" providerId="ADAL" clId="{26C117A3-088F-42BC-AF31-F80722652034}" dt="2021-11-03T23:24:02.424" v="758" actId="255"/>
       <pc:docMkLst>
         <pc:docMk/>
       </pc:docMkLst>
@@ -188,13 +206,13 @@
         </pc:spChg>
       </pc:sldChg>
       <pc:sldChg chg="addSp delSp modSp add mod">
-        <pc:chgData name="Kelly Stellmacher" userId="72fafaaf-3c6a-43d6-be09-4d3837118c48" providerId="ADAL" clId="{26C117A3-088F-42BC-AF31-F80722652034}" dt="2021-11-03T21:58:50.554" v="265" actId="1076"/>
+        <pc:chgData name="Kelly Stellmacher" userId="72fafaaf-3c6a-43d6-be09-4d3837118c48" providerId="ADAL" clId="{26C117A3-088F-42BC-AF31-F80722652034}" dt="2021-11-03T23:19:34.798" v="523" actId="1076"/>
         <pc:sldMkLst>
           <pc:docMk/>
           <pc:sldMk cId="643430349" sldId="259"/>
         </pc:sldMkLst>
         <pc:spChg chg="mod">
-          <ac:chgData name="Kelly Stellmacher" userId="72fafaaf-3c6a-43d6-be09-4d3837118c48" providerId="ADAL" clId="{26C117A3-088F-42BC-AF31-F80722652034}" dt="2021-11-02T00:29:20.513" v="119" actId="20577"/>
+          <ac:chgData name="Kelly Stellmacher" userId="72fafaaf-3c6a-43d6-be09-4d3837118c48" providerId="ADAL" clId="{26C117A3-088F-42BC-AF31-F80722652034}" dt="2021-11-03T23:19:23.799" v="521" actId="1076"/>
           <ac:spMkLst>
             <pc:docMk/>
             <pc:sldMk cId="643430349" sldId="259"/>
@@ -218,7 +236,7 @@
           </ac:spMkLst>
         </pc:spChg>
         <pc:spChg chg="add mod">
-          <ac:chgData name="Kelly Stellmacher" userId="72fafaaf-3c6a-43d6-be09-4d3837118c48" providerId="ADAL" clId="{26C117A3-088F-42BC-AF31-F80722652034}" dt="2021-11-03T21:58:43.594" v="264" actId="1076"/>
+          <ac:chgData name="Kelly Stellmacher" userId="72fafaaf-3c6a-43d6-be09-4d3837118c48" providerId="ADAL" clId="{26C117A3-088F-42BC-AF31-F80722652034}" dt="2021-11-03T23:19:34.798" v="523" actId="1076"/>
           <ac:spMkLst>
             <pc:docMk/>
             <pc:sldMk cId="643430349" sldId="259"/>
@@ -250,7 +268,7 @@
           </ac:picMkLst>
         </pc:picChg>
         <pc:picChg chg="add mod">
-          <ac:chgData name="Kelly Stellmacher" userId="72fafaaf-3c6a-43d6-be09-4d3837118c48" providerId="ADAL" clId="{26C117A3-088F-42BC-AF31-F80722652034}" dt="2021-11-03T21:58:43.594" v="264" actId="1076"/>
+          <ac:chgData name="Kelly Stellmacher" userId="72fafaaf-3c6a-43d6-be09-4d3837118c48" providerId="ADAL" clId="{26C117A3-088F-42BC-AF31-F80722652034}" dt="2021-11-03T23:19:34.798" v="523" actId="1076"/>
           <ac:picMkLst>
             <pc:docMk/>
             <pc:sldMk cId="643430349" sldId="259"/>
@@ -259,13 +277,13 @@
         </pc:picChg>
       </pc:sldChg>
       <pc:sldChg chg="addSp delSp modSp new mod">
-        <pc:chgData name="Kelly Stellmacher" userId="72fafaaf-3c6a-43d6-be09-4d3837118c48" providerId="ADAL" clId="{26C117A3-088F-42BC-AF31-F80722652034}" dt="2021-11-03T22:03:36.270" v="287" actId="1076"/>
+        <pc:chgData name="Kelly Stellmacher" userId="72fafaaf-3c6a-43d6-be09-4d3837118c48" providerId="ADAL" clId="{26C117A3-088F-42BC-AF31-F80722652034}" dt="2021-11-03T23:24:02.424" v="758" actId="255"/>
         <pc:sldMkLst>
           <pc:docMk/>
           <pc:sldMk cId="1741576544" sldId="260"/>
         </pc:sldMkLst>
         <pc:spChg chg="mod">
-          <ac:chgData name="Kelly Stellmacher" userId="72fafaaf-3c6a-43d6-be09-4d3837118c48" providerId="ADAL" clId="{26C117A3-088F-42BC-AF31-F80722652034}" dt="2021-11-03T22:03:36.270" v="287" actId="1076"/>
+          <ac:chgData name="Kelly Stellmacher" userId="72fafaaf-3c6a-43d6-be09-4d3837118c48" providerId="ADAL" clId="{26C117A3-088F-42BC-AF31-F80722652034}" dt="2021-11-03T23:18:11.935" v="482" actId="1076"/>
           <ac:spMkLst>
             <pc:docMk/>
             <pc:sldMk cId="1741576544" sldId="260"/>
@@ -278,6 +296,14 @@
             <pc:docMk/>
             <pc:sldMk cId="1741576544" sldId="260"/>
             <ac:spMk id="3" creationId="{2C7766DE-150D-4187-A427-2951149FFB7D}"/>
+          </ac:spMkLst>
+        </pc:spChg>
+        <pc:spChg chg="add mod">
+          <ac:chgData name="Kelly Stellmacher" userId="72fafaaf-3c6a-43d6-be09-4d3837118c48" providerId="ADAL" clId="{26C117A3-088F-42BC-AF31-F80722652034}" dt="2021-11-03T23:24:02.424" v="758" actId="255"/>
+          <ac:spMkLst>
+            <pc:docMk/>
+            <pc:sldMk cId="1741576544" sldId="260"/>
+            <ac:spMk id="3" creationId="{D43974B1-8D4A-4D6F-8D8F-13423A6924FE}"/>
           </ac:spMkLst>
         </pc:spChg>
         <pc:picChg chg="add mod ord">
@@ -298,7 +324,7 @@
         </pc:picChg>
       </pc:sldChg>
       <pc:sldChg chg="modSp add mod">
-        <pc:chgData name="Kelly Stellmacher" userId="72fafaaf-3c6a-43d6-be09-4d3837118c48" providerId="ADAL" clId="{26C117A3-088F-42BC-AF31-F80722652034}" dt="2021-11-02T00:30:02.276" v="151" actId="20577"/>
+        <pc:chgData name="Kelly Stellmacher" userId="72fafaaf-3c6a-43d6-be09-4d3837118c48" providerId="ADAL" clId="{26C117A3-088F-42BC-AF31-F80722652034}" dt="2021-11-03T23:22:11.818" v="721" actId="20577"/>
         <pc:sldMkLst>
           <pc:docMk/>
           <pc:sldMk cId="2641604588" sldId="261"/>
@@ -309,6 +335,14 @@
             <pc:docMk/>
             <pc:sldMk cId="2641604588" sldId="261"/>
             <ac:spMk id="2" creationId="{E8522C48-3748-4C93-A28D-4BDBE5CB90D7}"/>
+          </ac:spMkLst>
+        </pc:spChg>
+        <pc:spChg chg="mod">
+          <ac:chgData name="Kelly Stellmacher" userId="72fafaaf-3c6a-43d6-be09-4d3837118c48" providerId="ADAL" clId="{26C117A3-088F-42BC-AF31-F80722652034}" dt="2021-11-03T23:22:11.818" v="721" actId="20577"/>
+          <ac:spMkLst>
+            <pc:docMk/>
+            <pc:sldMk cId="2641604588" sldId="261"/>
+            <ac:spMk id="3" creationId="{2C7766DE-150D-4187-A427-2951149FFB7D}"/>
           </ac:spMkLst>
         </pc:spChg>
       </pc:sldChg>
@@ -5823,7 +5857,7 @@
         </p:nvSpPr>
         <p:spPr>
           <a:xfrm>
-            <a:off x="684212" y="136713"/>
+            <a:off x="684212" y="0"/>
             <a:ext cx="8534400" cy="1507067"/>
           </a:xfrm>
         </p:spPr>
@@ -5967,7 +6001,7 @@
         </p:blipFill>
         <p:spPr>
           <a:xfrm>
-            <a:off x="485460" y="1643780"/>
+            <a:off x="742106" y="1615929"/>
             <a:ext cx="4975856" cy="2334440"/>
           </a:xfrm>
           <a:prstGeom prst="rect">
@@ -6042,7 +6076,7 @@
         </p:nvSpPr>
         <p:spPr>
           <a:xfrm>
-            <a:off x="485460" y="1165587"/>
+            <a:off x="742106" y="1137735"/>
             <a:ext cx="2197289" cy="369332"/>
           </a:xfrm>
           <a:prstGeom prst="rect">
@@ -6154,7 +6188,7 @@
         </p:nvSpPr>
         <p:spPr>
           <a:xfrm>
-            <a:off x="190273" y="41596"/>
+            <a:off x="611875" y="-53938"/>
             <a:ext cx="8534400" cy="1507067"/>
           </a:xfrm>
         </p:spPr>
@@ -6259,6 +6293,108 @@
           </a:effectLst>
         </p:spPr>
       </p:pic>
+      <p:sp>
+        <p:nvSpPr>
+          <p:cNvPr id="3" name="TextBox 2">
+            <a:extLst>
+              <a:ext uri="{FF2B5EF4-FFF2-40B4-BE49-F238E27FC236}">
+                <a16:creationId xmlns:a16="http://schemas.microsoft.com/office/drawing/2014/main" id="{D43974B1-8D4A-4D6F-8D8F-13423A6924FE}"/>
+              </a:ext>
+            </a:extLst>
+          </p:cNvPr>
+          <p:cNvSpPr txBox="1"/>
+          <p:nvPr/>
+        </p:nvSpPr>
+        <p:spPr>
+          <a:xfrm>
+            <a:off x="611875" y="1201378"/>
+            <a:ext cx="6701051" cy="4154984"/>
+          </a:xfrm>
+          <a:prstGeom prst="rect">
+            <a:avLst/>
+          </a:prstGeom>
+          <a:noFill/>
+        </p:spPr>
+        <p:txBody>
+          <a:bodyPr wrap="square" rtlCol="0">
+            <a:spAutoFit/>
+          </a:bodyPr>
+          <a:lstStyle/>
+          <a:p>
+            <a:pPr marL="285750" indent="-285750">
+              <a:buFont typeface="Arial" panose="020B0604020202020204" pitchFamily="34" charset="0"/>
+              <a:buChar char="•"/>
+            </a:pPr>
+            <a:r>
+              <a:rPr lang="en-US" sz="2400" dirty="0"/>
+              <a:t>Figure 1: Floor</a:t>
+            </a:r>
+          </a:p>
+          <a:p>
+            <a:pPr marL="285750" indent="-285750">
+              <a:buFont typeface="Arial" panose="020B0604020202020204" pitchFamily="34" charset="0"/>
+              <a:buChar char="•"/>
+            </a:pPr>
+            <a:r>
+              <a:rPr lang="en-US" sz="2400" dirty="0"/>
+              <a:t>Figure 2: Room</a:t>
+            </a:r>
+          </a:p>
+          <a:p>
+            <a:r>
+              <a:rPr lang="en-US" sz="2400" dirty="0"/>
+              <a:t> </a:t>
+            </a:r>
+          </a:p>
+          <a:p>
+            <a:pPr marL="285750" indent="-285750">
+              <a:buFont typeface="Arial" panose="020B0604020202020204" pitchFamily="34" charset="0"/>
+              <a:buChar char="•"/>
+            </a:pPr>
+            <a:r>
+              <a:rPr lang="en-US" sz="2400" dirty="0"/>
+              <a:t>Parameter sweep wall thickness 0.1m-0.5m</a:t>
+            </a:r>
+          </a:p>
+          <a:p>
+            <a:pPr marL="285750" indent="-285750">
+              <a:buFont typeface="Arial" panose="020B0604020202020204" pitchFamily="34" charset="0"/>
+              <a:buChar char="•"/>
+            </a:pPr>
+            <a:r>
+              <a:rPr lang="en-US" sz="2400" dirty="0"/>
+              <a:t>Blue(1.0m) - too cold</a:t>
+            </a:r>
+          </a:p>
+          <a:p>
+            <a:pPr marL="285750" indent="-285750">
+              <a:buFont typeface="Arial" panose="020B0604020202020204" pitchFamily="34" charset="0"/>
+              <a:buChar char="•"/>
+            </a:pPr>
+            <a:r>
+              <a:rPr lang="en-US" sz="2400" dirty="0"/>
+              <a:t>Green (0.5m), purple(0.4m), yellow(0.3m) – too hot</a:t>
+            </a:r>
+          </a:p>
+          <a:p>
+            <a:pPr marL="285750" indent="-285750">
+              <a:buFont typeface="Arial" panose="020B0604020202020204" pitchFamily="34" charset="0"/>
+              <a:buChar char="•"/>
+            </a:pPr>
+            <a:r>
+              <a:rPr lang="en-US" sz="2400" dirty="0"/>
+              <a:t>Red (0.2m) is optimal --- high of ~28 low of ~12</a:t>
+            </a:r>
+          </a:p>
+          <a:p>
+            <a:pPr marL="285750" indent="-285750">
+              <a:buFont typeface="Arial" panose="020B0604020202020204" pitchFamily="34" charset="0"/>
+              <a:buChar char="•"/>
+            </a:pPr>
+            <a:endParaRPr lang="en-US" sz="2400" dirty="0"/>
+          </a:p>
+        </p:txBody>
+      </p:sp>
     </p:spTree>
     <p:extLst>
       <p:ext uri="{BB962C8B-B14F-4D97-AF65-F5344CB8AC3E}">
@@ -6340,13 +6476,55 @@
         </p:nvSpPr>
         <p:spPr>
           <a:xfrm>
-            <a:off x="684212" y="1898584"/>
-            <a:ext cx="8534400" cy="3615267"/>
+            <a:off x="684211" y="1898584"/>
+            <a:ext cx="9688087" cy="3615267"/>
           </a:xfrm>
         </p:spPr>
         <p:txBody>
           <a:bodyPr/>
           <a:lstStyle/>
+          <a:p>
+            <a:pPr marL="0" indent="0">
+              <a:buNone/>
+            </a:pPr>
+            <a:r>
+              <a:rPr lang="en-US" dirty="0"/>
+              <a:t>Answer to question:</a:t>
+            </a:r>
+          </a:p>
+          <a:p>
+            <a:r>
+              <a:rPr lang="en-US" dirty="0"/>
+              <a:t>0.2m wall thickness is optimal for a solar house in Columbus Winter</a:t>
+            </a:r>
+          </a:p>
+          <a:p>
+            <a:pPr marL="0" indent="0">
+              <a:buNone/>
+            </a:pPr>
+            <a:endParaRPr lang="en-US" dirty="0"/>
+          </a:p>
+          <a:p>
+            <a:pPr marL="0" indent="0">
+              <a:buNone/>
+            </a:pPr>
+            <a:r>
+              <a:rPr lang="en-US" dirty="0"/>
+              <a:t>Applications: </a:t>
+            </a:r>
+          </a:p>
+          <a:p>
+            <a:r>
+              <a:rPr lang="en-US" dirty="0"/>
+              <a:t>Architecture</a:t>
+            </a:r>
+          </a:p>
+          <a:p>
+            <a:r>
+              <a:rPr lang="en-US" dirty="0"/>
+              <a:t>Sustainability</a:t>
+            </a:r>
+          </a:p>
           <a:p>
             <a:endParaRPr lang="en-US" dirty="0"/>
           </a:p>

</xml_diff>

<commit_message>
commented script, basically done presentation, just one final read through
</commit_message>
<xml_diff>
--- a/Presentation.pptx
+++ b/Presentation.pptx
@@ -4,6 +4,9 @@
   <p:sldMasterIdLst>
     <p:sldMasterId id="2147483690" r:id="rId1"/>
   </p:sldMasterIdLst>
+  <p:notesMasterIdLst>
+    <p:notesMasterId r:id="rId8"/>
+  </p:notesMasterIdLst>
   <p:sldIdLst>
     <p:sldId id="256" r:id="rId2"/>
     <p:sldId id="258" r:id="rId3"/>
@@ -380,6 +383,703 @@
     </pc:docChg>
   </pc:docChgLst>
 </pc:chgInfo>
+</file>
+
+<file path=ppt/notesMasters/notesMaster1.xml><?xml version="1.0" encoding="utf-8"?>
+<p:notesMaster xmlns:a="http://schemas.openxmlformats.org/drawingml/2006/main" xmlns:r="http://schemas.openxmlformats.org/officeDocument/2006/relationships" xmlns:p="http://schemas.openxmlformats.org/presentationml/2006/main">
+  <p:cSld>
+    <p:bg>
+      <p:bgRef idx="1001">
+        <a:schemeClr val="bg1"/>
+      </p:bgRef>
+    </p:bg>
+    <p:spTree>
+      <p:nvGrpSpPr>
+        <p:cNvPr id="1" name=""/>
+        <p:cNvGrpSpPr/>
+        <p:nvPr/>
+      </p:nvGrpSpPr>
+      <p:grpSpPr>
+        <a:xfrm>
+          <a:off x="0" y="0"/>
+          <a:ext cx="0" cy="0"/>
+          <a:chOff x="0" y="0"/>
+          <a:chExt cx="0" cy="0"/>
+        </a:xfrm>
+      </p:grpSpPr>
+      <p:sp>
+        <p:nvSpPr>
+          <p:cNvPr id="2" name="Header Placeholder 1"/>
+          <p:cNvSpPr>
+            <a:spLocks noGrp="1"/>
+          </p:cNvSpPr>
+          <p:nvPr>
+            <p:ph type="hdr" sz="quarter"/>
+          </p:nvPr>
+        </p:nvSpPr>
+        <p:spPr>
+          <a:xfrm>
+            <a:off x="0" y="0"/>
+            <a:ext cx="2971800" cy="458788"/>
+          </a:xfrm>
+          <a:prstGeom prst="rect">
+            <a:avLst/>
+          </a:prstGeom>
+        </p:spPr>
+        <p:txBody>
+          <a:bodyPr vert="horz" lIns="91440" tIns="45720" rIns="91440" bIns="45720" rtlCol="0"/>
+          <a:lstStyle>
+            <a:lvl1pPr algn="l">
+              <a:defRPr sz="1200"/>
+            </a:lvl1pPr>
+          </a:lstStyle>
+          <a:p>
+            <a:endParaRPr lang="en-US"/>
+          </a:p>
+        </p:txBody>
+      </p:sp>
+      <p:sp>
+        <p:nvSpPr>
+          <p:cNvPr id="3" name="Date Placeholder 2"/>
+          <p:cNvSpPr>
+            <a:spLocks noGrp="1"/>
+          </p:cNvSpPr>
+          <p:nvPr>
+            <p:ph type="dt" idx="1"/>
+          </p:nvPr>
+        </p:nvSpPr>
+        <p:spPr>
+          <a:xfrm>
+            <a:off x="3884613" y="0"/>
+            <a:ext cx="2971800" cy="458788"/>
+          </a:xfrm>
+          <a:prstGeom prst="rect">
+            <a:avLst/>
+          </a:prstGeom>
+        </p:spPr>
+        <p:txBody>
+          <a:bodyPr vert="horz" lIns="91440" tIns="45720" rIns="91440" bIns="45720" rtlCol="0"/>
+          <a:lstStyle>
+            <a:lvl1pPr algn="r">
+              <a:defRPr sz="1200"/>
+            </a:lvl1pPr>
+          </a:lstStyle>
+          <a:p>
+            <a:fld id="{1393BED4-1263-48BF-BFF2-AF13C419DD60}" type="datetimeFigureOut">
+              <a:rPr lang="en-US" smtClean="0"/>
+              <a:t>11/3/2021</a:t>
+            </a:fld>
+            <a:endParaRPr lang="en-US"/>
+          </a:p>
+        </p:txBody>
+      </p:sp>
+      <p:sp>
+        <p:nvSpPr>
+          <p:cNvPr id="4" name="Slide Image Placeholder 3"/>
+          <p:cNvSpPr>
+            <a:spLocks noGrp="1" noRot="1" noChangeAspect="1"/>
+          </p:cNvSpPr>
+          <p:nvPr>
+            <p:ph type="sldImg" idx="2"/>
+          </p:nvPr>
+        </p:nvSpPr>
+        <p:spPr>
+          <a:xfrm>
+            <a:off x="685800" y="1143000"/>
+            <a:ext cx="5486400" cy="3086100"/>
+          </a:xfrm>
+          <a:prstGeom prst="rect">
+            <a:avLst/>
+          </a:prstGeom>
+          <a:noFill/>
+          <a:ln w="12700">
+            <a:solidFill>
+              <a:prstClr val="black"/>
+            </a:solidFill>
+          </a:ln>
+        </p:spPr>
+        <p:txBody>
+          <a:bodyPr vert="horz" lIns="91440" tIns="45720" rIns="91440" bIns="45720" rtlCol="0" anchor="ctr"/>
+          <a:lstStyle/>
+          <a:p>
+            <a:endParaRPr lang="en-US"/>
+          </a:p>
+        </p:txBody>
+      </p:sp>
+      <p:sp>
+        <p:nvSpPr>
+          <p:cNvPr id="5" name="Notes Placeholder 4"/>
+          <p:cNvSpPr>
+            <a:spLocks noGrp="1"/>
+          </p:cNvSpPr>
+          <p:nvPr>
+            <p:ph type="body" sz="quarter" idx="3"/>
+          </p:nvPr>
+        </p:nvSpPr>
+        <p:spPr>
+          <a:xfrm>
+            <a:off x="685800" y="4400550"/>
+            <a:ext cx="5486400" cy="3600450"/>
+          </a:xfrm>
+          <a:prstGeom prst="rect">
+            <a:avLst/>
+          </a:prstGeom>
+        </p:spPr>
+        <p:txBody>
+          <a:bodyPr vert="horz" lIns="91440" tIns="45720" rIns="91440" bIns="45720" rtlCol="0"/>
+          <a:lstStyle/>
+          <a:p>
+            <a:pPr lvl="0"/>
+            <a:r>
+              <a:rPr lang="en-US"/>
+              <a:t>Click to edit Master text styles</a:t>
+            </a:r>
+          </a:p>
+          <a:p>
+            <a:pPr lvl="1"/>
+            <a:r>
+              <a:rPr lang="en-US"/>
+              <a:t>Second level</a:t>
+            </a:r>
+          </a:p>
+          <a:p>
+            <a:pPr lvl="2"/>
+            <a:r>
+              <a:rPr lang="en-US"/>
+              <a:t>Third level</a:t>
+            </a:r>
+          </a:p>
+          <a:p>
+            <a:pPr lvl="3"/>
+            <a:r>
+              <a:rPr lang="en-US"/>
+              <a:t>Fourth level</a:t>
+            </a:r>
+          </a:p>
+          <a:p>
+            <a:pPr lvl="4"/>
+            <a:r>
+              <a:rPr lang="en-US"/>
+              <a:t>Fifth level</a:t>
+            </a:r>
+          </a:p>
+        </p:txBody>
+      </p:sp>
+      <p:sp>
+        <p:nvSpPr>
+          <p:cNvPr id="6" name="Footer Placeholder 5"/>
+          <p:cNvSpPr>
+            <a:spLocks noGrp="1"/>
+          </p:cNvSpPr>
+          <p:nvPr>
+            <p:ph type="ftr" sz="quarter" idx="4"/>
+          </p:nvPr>
+        </p:nvSpPr>
+        <p:spPr>
+          <a:xfrm>
+            <a:off x="0" y="8685213"/>
+            <a:ext cx="2971800" cy="458787"/>
+          </a:xfrm>
+          <a:prstGeom prst="rect">
+            <a:avLst/>
+          </a:prstGeom>
+        </p:spPr>
+        <p:txBody>
+          <a:bodyPr vert="horz" lIns="91440" tIns="45720" rIns="91440" bIns="45720" rtlCol="0" anchor="b"/>
+          <a:lstStyle>
+            <a:lvl1pPr algn="l">
+              <a:defRPr sz="1200"/>
+            </a:lvl1pPr>
+          </a:lstStyle>
+          <a:p>
+            <a:endParaRPr lang="en-US"/>
+          </a:p>
+        </p:txBody>
+      </p:sp>
+      <p:sp>
+        <p:nvSpPr>
+          <p:cNvPr id="7" name="Slide Number Placeholder 6"/>
+          <p:cNvSpPr>
+            <a:spLocks noGrp="1"/>
+          </p:cNvSpPr>
+          <p:nvPr>
+            <p:ph type="sldNum" sz="quarter" idx="5"/>
+          </p:nvPr>
+        </p:nvSpPr>
+        <p:spPr>
+          <a:xfrm>
+            <a:off x="3884613" y="8685213"/>
+            <a:ext cx="2971800" cy="458787"/>
+          </a:xfrm>
+          <a:prstGeom prst="rect">
+            <a:avLst/>
+          </a:prstGeom>
+        </p:spPr>
+        <p:txBody>
+          <a:bodyPr vert="horz" lIns="91440" tIns="45720" rIns="91440" bIns="45720" rtlCol="0" anchor="b"/>
+          <a:lstStyle>
+            <a:lvl1pPr algn="r">
+              <a:defRPr sz="1200"/>
+            </a:lvl1pPr>
+          </a:lstStyle>
+          <a:p>
+            <a:fld id="{8552BDF1-02E0-47AA-AA9F-8FFFF410F083}" type="slidenum">
+              <a:rPr lang="en-US" smtClean="0"/>
+              <a:t>‹#›</a:t>
+            </a:fld>
+            <a:endParaRPr lang="en-US"/>
+          </a:p>
+        </p:txBody>
+      </p:sp>
+    </p:spTree>
+    <p:extLst>
+      <p:ext uri="{BB962C8B-B14F-4D97-AF65-F5344CB8AC3E}">
+        <p14:creationId xmlns:p14="http://schemas.microsoft.com/office/powerpoint/2010/main" val="833091789"/>
+      </p:ext>
+    </p:extLst>
+  </p:cSld>
+  <p:clrMap bg1="lt1" tx1="dk1" bg2="lt2" tx2="dk2" accent1="accent1" accent2="accent2" accent3="accent3" accent4="accent4" accent5="accent5" accent6="accent6" hlink="hlink" folHlink="folHlink"/>
+  <p:notesStyle>
+    <a:lvl1pPr marL="0" algn="l" defTabSz="914400" rtl="0" eaLnBrk="1" latinLnBrk="0" hangingPunct="1">
+      <a:defRPr sz="1200" kern="1200">
+        <a:solidFill>
+          <a:schemeClr val="tx1"/>
+        </a:solidFill>
+        <a:latin typeface="+mn-lt"/>
+        <a:ea typeface="+mn-ea"/>
+        <a:cs typeface="+mn-cs"/>
+      </a:defRPr>
+    </a:lvl1pPr>
+    <a:lvl2pPr marL="457200" algn="l" defTabSz="914400" rtl="0" eaLnBrk="1" latinLnBrk="0" hangingPunct="1">
+      <a:defRPr sz="1200" kern="1200">
+        <a:solidFill>
+          <a:schemeClr val="tx1"/>
+        </a:solidFill>
+        <a:latin typeface="+mn-lt"/>
+        <a:ea typeface="+mn-ea"/>
+        <a:cs typeface="+mn-cs"/>
+      </a:defRPr>
+    </a:lvl2pPr>
+    <a:lvl3pPr marL="914400" algn="l" defTabSz="914400" rtl="0" eaLnBrk="1" latinLnBrk="0" hangingPunct="1">
+      <a:defRPr sz="1200" kern="1200">
+        <a:solidFill>
+          <a:schemeClr val="tx1"/>
+        </a:solidFill>
+        <a:latin typeface="+mn-lt"/>
+        <a:ea typeface="+mn-ea"/>
+        <a:cs typeface="+mn-cs"/>
+      </a:defRPr>
+    </a:lvl3pPr>
+    <a:lvl4pPr marL="1371600" algn="l" defTabSz="914400" rtl="0" eaLnBrk="1" latinLnBrk="0" hangingPunct="1">
+      <a:defRPr sz="1200" kern="1200">
+        <a:solidFill>
+          <a:schemeClr val="tx1"/>
+        </a:solidFill>
+        <a:latin typeface="+mn-lt"/>
+        <a:ea typeface="+mn-ea"/>
+        <a:cs typeface="+mn-cs"/>
+      </a:defRPr>
+    </a:lvl4pPr>
+    <a:lvl5pPr marL="1828800" algn="l" defTabSz="914400" rtl="0" eaLnBrk="1" latinLnBrk="0" hangingPunct="1">
+      <a:defRPr sz="1200" kern="1200">
+        <a:solidFill>
+          <a:schemeClr val="tx1"/>
+        </a:solidFill>
+        <a:latin typeface="+mn-lt"/>
+        <a:ea typeface="+mn-ea"/>
+        <a:cs typeface="+mn-cs"/>
+      </a:defRPr>
+    </a:lvl5pPr>
+    <a:lvl6pPr marL="2286000" algn="l" defTabSz="914400" rtl="0" eaLnBrk="1" latinLnBrk="0" hangingPunct="1">
+      <a:defRPr sz="1200" kern="1200">
+        <a:solidFill>
+          <a:schemeClr val="tx1"/>
+        </a:solidFill>
+        <a:latin typeface="+mn-lt"/>
+        <a:ea typeface="+mn-ea"/>
+        <a:cs typeface="+mn-cs"/>
+      </a:defRPr>
+    </a:lvl6pPr>
+    <a:lvl7pPr marL="2743200" algn="l" defTabSz="914400" rtl="0" eaLnBrk="1" latinLnBrk="0" hangingPunct="1">
+      <a:defRPr sz="1200" kern="1200">
+        <a:solidFill>
+          <a:schemeClr val="tx1"/>
+        </a:solidFill>
+        <a:latin typeface="+mn-lt"/>
+        <a:ea typeface="+mn-ea"/>
+        <a:cs typeface="+mn-cs"/>
+      </a:defRPr>
+    </a:lvl7pPr>
+    <a:lvl8pPr marL="3200400" algn="l" defTabSz="914400" rtl="0" eaLnBrk="1" latinLnBrk="0" hangingPunct="1">
+      <a:defRPr sz="1200" kern="1200">
+        <a:solidFill>
+          <a:schemeClr val="tx1"/>
+        </a:solidFill>
+        <a:latin typeface="+mn-lt"/>
+        <a:ea typeface="+mn-ea"/>
+        <a:cs typeface="+mn-cs"/>
+      </a:defRPr>
+    </a:lvl8pPr>
+    <a:lvl9pPr marL="3657600" algn="l" defTabSz="914400" rtl="0" eaLnBrk="1" latinLnBrk="0" hangingPunct="1">
+      <a:defRPr sz="1200" kern="1200">
+        <a:solidFill>
+          <a:schemeClr val="tx1"/>
+        </a:solidFill>
+        <a:latin typeface="+mn-lt"/>
+        <a:ea typeface="+mn-ea"/>
+        <a:cs typeface="+mn-cs"/>
+      </a:defRPr>
+    </a:lvl9pPr>
+  </p:notesStyle>
+</p:notesMaster>
+</file>
+
+<file path=ppt/notesSlides/notesSlide1.xml><?xml version="1.0" encoding="utf-8"?>
+<p:notes xmlns:a="http://schemas.openxmlformats.org/drawingml/2006/main" xmlns:r="http://schemas.openxmlformats.org/officeDocument/2006/relationships" xmlns:p="http://schemas.openxmlformats.org/presentationml/2006/main">
+  <p:cSld>
+    <p:spTree>
+      <p:nvGrpSpPr>
+        <p:cNvPr id="1" name=""/>
+        <p:cNvGrpSpPr/>
+        <p:nvPr/>
+      </p:nvGrpSpPr>
+      <p:grpSpPr>
+        <a:xfrm>
+          <a:off x="0" y="0"/>
+          <a:ext cx="0" cy="0"/>
+          <a:chOff x="0" y="0"/>
+          <a:chExt cx="0" cy="0"/>
+        </a:xfrm>
+      </p:grpSpPr>
+      <p:sp>
+        <p:nvSpPr>
+          <p:cNvPr id="2" name="Slide Image Placeholder 1"/>
+          <p:cNvSpPr>
+            <a:spLocks noGrp="1" noRot="1" noChangeAspect="1"/>
+          </p:cNvSpPr>
+          <p:nvPr>
+            <p:ph type="sldImg"/>
+          </p:nvPr>
+        </p:nvSpPr>
+        <p:spPr/>
+      </p:sp>
+      <p:sp>
+        <p:nvSpPr>
+          <p:cNvPr id="3" name="Notes Placeholder 2"/>
+          <p:cNvSpPr>
+            <a:spLocks noGrp="1"/>
+          </p:cNvSpPr>
+          <p:nvPr>
+            <p:ph type="body" idx="1"/>
+          </p:nvPr>
+        </p:nvSpPr>
+        <p:spPr/>
+        <p:txBody>
+          <a:bodyPr/>
+          <a:lstStyle/>
+          <a:p>
+            <a:r>
+              <a:rPr lang="en-US" dirty="0"/>
+              <a:t>Drew</a:t>
+            </a:r>
+          </a:p>
+        </p:txBody>
+      </p:sp>
+      <p:sp>
+        <p:nvSpPr>
+          <p:cNvPr id="4" name="Slide Number Placeholder 3"/>
+          <p:cNvSpPr>
+            <a:spLocks noGrp="1"/>
+          </p:cNvSpPr>
+          <p:nvPr>
+            <p:ph type="sldNum" sz="quarter" idx="5"/>
+          </p:nvPr>
+        </p:nvSpPr>
+        <p:spPr/>
+        <p:txBody>
+          <a:bodyPr/>
+          <a:lstStyle/>
+          <a:p>
+            <a:fld id="{8552BDF1-02E0-47AA-AA9F-8FFFF410F083}" type="slidenum">
+              <a:rPr lang="en-US" smtClean="0"/>
+              <a:t>2</a:t>
+            </a:fld>
+            <a:endParaRPr lang="en-US"/>
+          </a:p>
+        </p:txBody>
+      </p:sp>
+    </p:spTree>
+    <p:extLst>
+      <p:ext uri="{BB962C8B-B14F-4D97-AF65-F5344CB8AC3E}">
+        <p14:creationId xmlns:p14="http://schemas.microsoft.com/office/powerpoint/2010/main" val="2453249513"/>
+      </p:ext>
+    </p:extLst>
+  </p:cSld>
+  <p:clrMapOvr>
+    <a:masterClrMapping/>
+  </p:clrMapOvr>
+</p:notes>
+</file>
+
+<file path=ppt/notesSlides/notesSlide2.xml><?xml version="1.0" encoding="utf-8"?>
+<p:notes xmlns:a="http://schemas.openxmlformats.org/drawingml/2006/main" xmlns:r="http://schemas.openxmlformats.org/officeDocument/2006/relationships" xmlns:p="http://schemas.openxmlformats.org/presentationml/2006/main">
+  <p:cSld>
+    <p:spTree>
+      <p:nvGrpSpPr>
+        <p:cNvPr id="1" name=""/>
+        <p:cNvGrpSpPr/>
+        <p:nvPr/>
+      </p:nvGrpSpPr>
+      <p:grpSpPr>
+        <a:xfrm>
+          <a:off x="0" y="0"/>
+          <a:ext cx="0" cy="0"/>
+          <a:chOff x="0" y="0"/>
+          <a:chExt cx="0" cy="0"/>
+        </a:xfrm>
+      </p:grpSpPr>
+      <p:sp>
+        <p:nvSpPr>
+          <p:cNvPr id="2" name="Slide Image Placeholder 1"/>
+          <p:cNvSpPr>
+            <a:spLocks noGrp="1" noRot="1" noChangeAspect="1"/>
+          </p:cNvSpPr>
+          <p:nvPr>
+            <p:ph type="sldImg"/>
+          </p:nvPr>
+        </p:nvSpPr>
+        <p:spPr/>
+      </p:sp>
+      <p:sp>
+        <p:nvSpPr>
+          <p:cNvPr id="3" name="Notes Placeholder 2"/>
+          <p:cNvSpPr>
+            <a:spLocks noGrp="1"/>
+          </p:cNvSpPr>
+          <p:nvPr>
+            <p:ph type="body" idx="1"/>
+          </p:nvPr>
+        </p:nvSpPr>
+        <p:spPr/>
+        <p:txBody>
+          <a:bodyPr/>
+          <a:lstStyle/>
+          <a:p>
+            <a:r>
+              <a:rPr lang="en-US" dirty="0"/>
+              <a:t>Kelly</a:t>
+            </a:r>
+          </a:p>
+        </p:txBody>
+      </p:sp>
+      <p:sp>
+        <p:nvSpPr>
+          <p:cNvPr id="4" name="Slide Number Placeholder 3"/>
+          <p:cNvSpPr>
+            <a:spLocks noGrp="1"/>
+          </p:cNvSpPr>
+          <p:nvPr>
+            <p:ph type="sldNum" sz="quarter" idx="5"/>
+          </p:nvPr>
+        </p:nvSpPr>
+        <p:spPr/>
+        <p:txBody>
+          <a:bodyPr/>
+          <a:lstStyle/>
+          <a:p>
+            <a:fld id="{8552BDF1-02E0-47AA-AA9F-8FFFF410F083}" type="slidenum">
+              <a:rPr lang="en-US" smtClean="0"/>
+              <a:t>3</a:t>
+            </a:fld>
+            <a:endParaRPr lang="en-US"/>
+          </a:p>
+        </p:txBody>
+      </p:sp>
+    </p:spTree>
+    <p:extLst>
+      <p:ext uri="{BB962C8B-B14F-4D97-AF65-F5344CB8AC3E}">
+        <p14:creationId xmlns:p14="http://schemas.microsoft.com/office/powerpoint/2010/main" val="4087958972"/>
+      </p:ext>
+    </p:extLst>
+  </p:cSld>
+  <p:clrMapOvr>
+    <a:masterClrMapping/>
+  </p:clrMapOvr>
+</p:notes>
+</file>
+
+<file path=ppt/notesSlides/notesSlide3.xml><?xml version="1.0" encoding="utf-8"?>
+<p:notes xmlns:a="http://schemas.openxmlformats.org/drawingml/2006/main" xmlns:r="http://schemas.openxmlformats.org/officeDocument/2006/relationships" xmlns:p="http://schemas.openxmlformats.org/presentationml/2006/main">
+  <p:cSld>
+    <p:spTree>
+      <p:nvGrpSpPr>
+        <p:cNvPr id="1" name=""/>
+        <p:cNvGrpSpPr/>
+        <p:nvPr/>
+      </p:nvGrpSpPr>
+      <p:grpSpPr>
+        <a:xfrm>
+          <a:off x="0" y="0"/>
+          <a:ext cx="0" cy="0"/>
+          <a:chOff x="0" y="0"/>
+          <a:chExt cx="0" cy="0"/>
+        </a:xfrm>
+      </p:grpSpPr>
+      <p:sp>
+        <p:nvSpPr>
+          <p:cNvPr id="2" name="Slide Image Placeholder 1"/>
+          <p:cNvSpPr>
+            <a:spLocks noGrp="1" noRot="1" noChangeAspect="1"/>
+          </p:cNvSpPr>
+          <p:nvPr>
+            <p:ph type="sldImg"/>
+          </p:nvPr>
+        </p:nvSpPr>
+        <p:spPr/>
+      </p:sp>
+      <p:sp>
+        <p:nvSpPr>
+          <p:cNvPr id="3" name="Notes Placeholder 2"/>
+          <p:cNvSpPr>
+            <a:spLocks noGrp="1"/>
+          </p:cNvSpPr>
+          <p:nvPr>
+            <p:ph type="body" idx="1"/>
+          </p:nvPr>
+        </p:nvSpPr>
+        <p:spPr/>
+        <p:txBody>
+          <a:bodyPr/>
+          <a:lstStyle/>
+          <a:p>
+            <a:r>
+              <a:rPr lang="en-US" dirty="0"/>
+              <a:t>Drew</a:t>
+            </a:r>
+          </a:p>
+        </p:txBody>
+      </p:sp>
+      <p:sp>
+        <p:nvSpPr>
+          <p:cNvPr id="4" name="Slide Number Placeholder 3"/>
+          <p:cNvSpPr>
+            <a:spLocks noGrp="1"/>
+          </p:cNvSpPr>
+          <p:nvPr>
+            <p:ph type="sldNum" sz="quarter" idx="5"/>
+          </p:nvPr>
+        </p:nvSpPr>
+        <p:spPr/>
+        <p:txBody>
+          <a:bodyPr/>
+          <a:lstStyle/>
+          <a:p>
+            <a:fld id="{8552BDF1-02E0-47AA-AA9F-8FFFF410F083}" type="slidenum">
+              <a:rPr lang="en-US" smtClean="0"/>
+              <a:t>4</a:t>
+            </a:fld>
+            <a:endParaRPr lang="en-US"/>
+          </a:p>
+        </p:txBody>
+      </p:sp>
+    </p:spTree>
+    <p:extLst>
+      <p:ext uri="{BB962C8B-B14F-4D97-AF65-F5344CB8AC3E}">
+        <p14:creationId xmlns:p14="http://schemas.microsoft.com/office/powerpoint/2010/main" val="2662015158"/>
+      </p:ext>
+    </p:extLst>
+  </p:cSld>
+  <p:clrMapOvr>
+    <a:masterClrMapping/>
+  </p:clrMapOvr>
+</p:notes>
+</file>
+
+<file path=ppt/notesSlides/notesSlide4.xml><?xml version="1.0" encoding="utf-8"?>
+<p:notes xmlns:a="http://schemas.openxmlformats.org/drawingml/2006/main" xmlns:r="http://schemas.openxmlformats.org/officeDocument/2006/relationships" xmlns:p="http://schemas.openxmlformats.org/presentationml/2006/main">
+  <p:cSld>
+    <p:spTree>
+      <p:nvGrpSpPr>
+        <p:cNvPr id="1" name=""/>
+        <p:cNvGrpSpPr/>
+        <p:nvPr/>
+      </p:nvGrpSpPr>
+      <p:grpSpPr>
+        <a:xfrm>
+          <a:off x="0" y="0"/>
+          <a:ext cx="0" cy="0"/>
+          <a:chOff x="0" y="0"/>
+          <a:chExt cx="0" cy="0"/>
+        </a:xfrm>
+      </p:grpSpPr>
+      <p:sp>
+        <p:nvSpPr>
+          <p:cNvPr id="2" name="Slide Image Placeholder 1"/>
+          <p:cNvSpPr>
+            <a:spLocks noGrp="1" noRot="1" noChangeAspect="1"/>
+          </p:cNvSpPr>
+          <p:nvPr>
+            <p:ph type="sldImg"/>
+          </p:nvPr>
+        </p:nvSpPr>
+        <p:spPr/>
+      </p:sp>
+      <p:sp>
+        <p:nvSpPr>
+          <p:cNvPr id="3" name="Notes Placeholder 2"/>
+          <p:cNvSpPr>
+            <a:spLocks noGrp="1"/>
+          </p:cNvSpPr>
+          <p:nvPr>
+            <p:ph type="body" idx="1"/>
+          </p:nvPr>
+        </p:nvSpPr>
+        <p:spPr/>
+        <p:txBody>
+          <a:bodyPr/>
+          <a:lstStyle/>
+          <a:p>
+            <a:r>
+              <a:rPr lang="en-US" dirty="0"/>
+              <a:t>Kelly</a:t>
+            </a:r>
+          </a:p>
+        </p:txBody>
+      </p:sp>
+      <p:sp>
+        <p:nvSpPr>
+          <p:cNvPr id="4" name="Slide Number Placeholder 3"/>
+          <p:cNvSpPr>
+            <a:spLocks noGrp="1"/>
+          </p:cNvSpPr>
+          <p:nvPr>
+            <p:ph type="sldNum" sz="quarter" idx="5"/>
+          </p:nvPr>
+        </p:nvSpPr>
+        <p:spPr/>
+        <p:txBody>
+          <a:bodyPr/>
+          <a:lstStyle/>
+          <a:p>
+            <a:fld id="{8552BDF1-02E0-47AA-AA9F-8FFFF410F083}" type="slidenum">
+              <a:rPr lang="en-US" smtClean="0"/>
+              <a:t>5</a:t>
+            </a:fld>
+            <a:endParaRPr lang="en-US"/>
+          </a:p>
+        </p:txBody>
+      </p:sp>
+    </p:spTree>
+    <p:extLst>
+      <p:ext uri="{BB962C8B-B14F-4D97-AF65-F5344CB8AC3E}">
+        <p14:creationId xmlns:p14="http://schemas.microsoft.com/office/powerpoint/2010/main" val="3950394305"/>
+      </p:ext>
+    </p:extLst>
+  </p:cSld>
+  <p:clrMapOvr>
+    <a:masterClrMapping/>
+  </p:clrMapOvr>
+</p:notes>
 </file>
 
 <file path=ppt/slideLayouts/slideLayout1.xml><?xml version="1.0" encoding="utf-8"?>
@@ -5695,7 +6395,11 @@
           <a:lstStyle/>
           <a:p>
             <a:r>
-              <a:rPr lang="en-US" dirty="0"/>
+              <a:rPr lang="en-US" dirty="0">
+                <a:solidFill>
+                  <a:schemeClr val="tx1"/>
+                </a:solidFill>
+              </a:rPr>
               <a:t>Drew Pang and Kelly Stellmacher</a:t>
             </a:r>
           </a:p>
@@ -5794,9 +6498,9 @@
               <a:buNone/>
             </a:pPr>
             <a:r>
-              <a:rPr lang="en-US" sz="4000" b="0" i="0" dirty="0">
-                <a:solidFill>
-                  <a:srgbClr val="000000"/>
+              <a:rPr lang="en-US" sz="4000" b="1" i="0" dirty="0">
+                <a:solidFill>
+                  <a:schemeClr val="tx1"/>
                 </a:solidFill>
                 <a:effectLst/>
                 <a:latin typeface="Helvetica" panose="020B0604020202020204" pitchFamily="34" charset="0"/>
@@ -5805,7 +6509,11 @@
             </a:r>
           </a:p>
           <a:p>
-            <a:endParaRPr lang="en-US" dirty="0"/>
+            <a:endParaRPr lang="en-US" b="1" dirty="0">
+              <a:solidFill>
+                <a:schemeClr val="tx1"/>
+              </a:solidFill>
+            </a:endParaRPr>
           </a:p>
         </p:txBody>
       </p:sp>
@@ -5889,7 +6597,7 @@
           </p:nvPr>
         </p:nvPicPr>
         <p:blipFill>
-          <a:blip r:embed="rId2">
+          <a:blip r:embed="rId3">
             <a:extLst>
               <a:ext uri="{28A0092B-C50C-407E-A947-70E740481C1C}">
                 <a14:useLocalDpi xmlns:a14="http://schemas.microsoft.com/office/drawing/2010/main" val="0"/>
@@ -5939,7 +6647,7 @@
           <p:nvPr/>
         </p:nvPicPr>
         <p:blipFill rotWithShape="1">
-          <a:blip r:embed="rId3">
+          <a:blip r:embed="rId4">
             <a:extLst>
               <a:ext uri="{28A0092B-C50C-407E-A947-70E740481C1C}">
                 <a14:useLocalDpi xmlns:a14="http://schemas.microsoft.com/office/drawing/2010/main" val="0"/>
@@ -5988,7 +6696,7 @@
           <p:nvPr/>
         </p:nvPicPr>
         <p:blipFill>
-          <a:blip r:embed="rId4">
+          <a:blip r:embed="rId5">
             <a:extLst>
               <a:ext uri="{28A0092B-C50C-407E-A947-70E740481C1C}">
                 <a14:useLocalDpi xmlns:a14="http://schemas.microsoft.com/office/drawing/2010/main" val="0"/>
@@ -6057,7 +6765,19 @@
                   <a:schemeClr val="bg1"/>
                 </a:solidFill>
               </a:rPr>
-              <a:t>Stock and Flow Diagram:</a:t>
+              <a:t>Stock </a:t>
+            </a:r>
+            <a:r>
+              <a:rPr lang="en-US" dirty="0"/>
+              <a:t>and</a:t>
+            </a:r>
+            <a:r>
+              <a:rPr lang="en-US" dirty="0">
+                <a:solidFill>
+                  <a:schemeClr val="bg1"/>
+                </a:solidFill>
+              </a:rPr>
+              <a:t> Flow Diagram:</a:t>
             </a:r>
           </a:p>
         </p:txBody>
@@ -6091,11 +6811,7 @@
           <a:lstStyle/>
           <a:p>
             <a:r>
-              <a:rPr lang="en-US" dirty="0">
-                <a:solidFill>
-                  <a:schemeClr val="bg1"/>
-                </a:solidFill>
-              </a:rPr>
+              <a:rPr lang="en-US" dirty="0"/>
               <a:t>Schematic:</a:t>
             </a:r>
           </a:p>
@@ -6130,11 +6846,7 @@
           <a:lstStyle/>
           <a:p>
             <a:r>
-              <a:rPr lang="en-US" dirty="0">
-                <a:solidFill>
-                  <a:schemeClr val="bg1"/>
-                </a:solidFill>
-              </a:rPr>
+              <a:rPr lang="en-US" dirty="0"/>
               <a:t>Equations:</a:t>
             </a:r>
           </a:p>
@@ -6188,7 +6900,7 @@
         </p:nvSpPr>
         <p:spPr>
           <a:xfrm>
-            <a:off x="611875" y="-53938"/>
+            <a:off x="611875" y="0"/>
             <a:ext cx="8534400" cy="1507067"/>
           </a:xfrm>
         </p:spPr>
@@ -6220,7 +6932,7 @@
           </p:nvPr>
         </p:nvPicPr>
         <p:blipFill>
-          <a:blip r:embed="rId2"/>
+          <a:blip r:embed="rId3"/>
           <a:stretch>
             <a:fillRect/>
           </a:stretch>
@@ -6264,7 +6976,7 @@
           <p:nvPr/>
         </p:nvPicPr>
         <p:blipFill>
-          <a:blip r:embed="rId3"/>
+          <a:blip r:embed="rId4"/>
           <a:stretch>
             <a:fillRect/>
           </a:stretch>
@@ -6307,8 +7019,8 @@
         </p:nvSpPr>
         <p:spPr>
           <a:xfrm>
-            <a:off x="611875" y="1201378"/>
-            <a:ext cx="6701051" cy="4154984"/>
+            <a:off x="1021309" y="1786652"/>
+            <a:ext cx="5484124" cy="4154984"/>
           </a:xfrm>
           <a:prstGeom prst="rect">
             <a:avLst/>
@@ -6481,20 +7193,30 @@
           </a:xfrm>
         </p:spPr>
         <p:txBody>
-          <a:bodyPr/>
+          <a:bodyPr>
+            <a:normAutofit fontScale="92500" lnSpcReduction="10000"/>
+          </a:bodyPr>
           <a:lstStyle/>
           <a:p>
             <a:pPr marL="0" indent="0">
               <a:buNone/>
             </a:pPr>
             <a:r>
-              <a:rPr lang="en-US" dirty="0"/>
+              <a:rPr lang="en-US" sz="2800" dirty="0">
+                <a:solidFill>
+                  <a:schemeClr val="tx1"/>
+                </a:solidFill>
+              </a:rPr>
               <a:t>Answer to question:</a:t>
             </a:r>
           </a:p>
           <a:p>
             <a:r>
-              <a:rPr lang="en-US" dirty="0"/>
+              <a:rPr lang="en-US" sz="2800" dirty="0">
+                <a:solidFill>
+                  <a:schemeClr val="tx1"/>
+                </a:solidFill>
+              </a:rPr>
               <a:t>0.2m wall thickness is optimal for a solar house in Columbus Winter</a:t>
             </a:r>
           </a:p>
@@ -6502,26 +7224,42 @@
             <a:pPr marL="0" indent="0">
               <a:buNone/>
             </a:pPr>
-            <a:endParaRPr lang="en-US" dirty="0"/>
+            <a:endParaRPr lang="en-US" sz="2800" dirty="0">
+              <a:solidFill>
+                <a:schemeClr val="tx1"/>
+              </a:solidFill>
+            </a:endParaRPr>
           </a:p>
           <a:p>
             <a:pPr marL="0" indent="0">
               <a:buNone/>
             </a:pPr>
             <a:r>
-              <a:rPr lang="en-US" dirty="0"/>
+              <a:rPr lang="en-US" sz="2800" dirty="0">
+                <a:solidFill>
+                  <a:schemeClr val="tx1"/>
+                </a:solidFill>
+              </a:rPr>
               <a:t>Applications: </a:t>
             </a:r>
           </a:p>
           <a:p>
             <a:r>
-              <a:rPr lang="en-US" dirty="0"/>
+              <a:rPr lang="en-US" sz="2800" dirty="0">
+                <a:solidFill>
+                  <a:schemeClr val="tx1"/>
+                </a:solidFill>
+              </a:rPr>
               <a:t>Architecture</a:t>
             </a:r>
           </a:p>
           <a:p>
             <a:r>
-              <a:rPr lang="en-US" dirty="0"/>
+              <a:rPr lang="en-US" sz="2800" dirty="0">
+                <a:solidFill>
+                  <a:schemeClr val="tx1"/>
+                </a:solidFill>
+              </a:rPr>
               <a:t>Sustainability</a:t>
             </a:r>
           </a:p>
@@ -6873,4 +7611,299 @@
     </a:ext>
   </a:extLst>
 </a:theme>
+</file>
+
+<file path=ppt/theme/theme2.xml><?xml version="1.0" encoding="utf-8"?>
+<a:theme xmlns:a="http://schemas.openxmlformats.org/drawingml/2006/main" name="Office Theme">
+  <a:themeElements>
+    <a:clrScheme name="Office">
+      <a:dk1>
+        <a:sysClr val="windowText" lastClr="000000"/>
+      </a:dk1>
+      <a:lt1>
+        <a:sysClr val="window" lastClr="FFFFFF"/>
+      </a:lt1>
+      <a:dk2>
+        <a:srgbClr val="44546A"/>
+      </a:dk2>
+      <a:lt2>
+        <a:srgbClr val="E7E6E6"/>
+      </a:lt2>
+      <a:accent1>
+        <a:srgbClr val="4472C4"/>
+      </a:accent1>
+      <a:accent2>
+        <a:srgbClr val="ED7D31"/>
+      </a:accent2>
+      <a:accent3>
+        <a:srgbClr val="A5A5A5"/>
+      </a:accent3>
+      <a:accent4>
+        <a:srgbClr val="FFC000"/>
+      </a:accent4>
+      <a:accent5>
+        <a:srgbClr val="5B9BD5"/>
+      </a:accent5>
+      <a:accent6>
+        <a:srgbClr val="70AD47"/>
+      </a:accent6>
+      <a:hlink>
+        <a:srgbClr val="0563C1"/>
+      </a:hlink>
+      <a:folHlink>
+        <a:srgbClr val="954F72"/>
+      </a:folHlink>
+    </a:clrScheme>
+    <a:fontScheme name="Office">
+      <a:majorFont>
+        <a:latin typeface="Calibri Light" panose="020F0302020204030204"/>
+        <a:ea typeface=""/>
+        <a:cs typeface=""/>
+        <a:font script="Jpan" typeface="游ゴシック Light"/>
+        <a:font script="Hang" typeface="맑은 고딕"/>
+        <a:font script="Hans" typeface="等线 Light"/>
+        <a:font script="Hant" typeface="新細明體"/>
+        <a:font script="Arab" typeface="Times New Roman"/>
+        <a:font script="Hebr" typeface="Times New Roman"/>
+        <a:font script="Thai" typeface="Angsana New"/>
+        <a:font script="Ethi" typeface="Nyala"/>
+        <a:font script="Beng" typeface="Vrinda"/>
+        <a:font script="Gujr" typeface="Shruti"/>
+        <a:font script="Khmr" typeface="MoolBoran"/>
+        <a:font script="Knda" typeface="Tunga"/>
+        <a:font script="Guru" typeface="Raavi"/>
+        <a:font script="Cans" typeface="Euphemia"/>
+        <a:font script="Cher" typeface="Plantagenet Cherokee"/>
+        <a:font script="Yiii" typeface="Microsoft Yi Baiti"/>
+        <a:font script="Tibt" typeface="Microsoft Himalaya"/>
+        <a:font script="Thaa" typeface="MV Boli"/>
+        <a:font script="Deva" typeface="Mangal"/>
+        <a:font script="Telu" typeface="Gautami"/>
+        <a:font script="Taml" typeface="Latha"/>
+        <a:font script="Syrc" typeface="Estrangelo Edessa"/>
+        <a:font script="Orya" typeface="Kalinga"/>
+        <a:font script="Mlym" typeface="Kartika"/>
+        <a:font script="Laoo" typeface="DokChampa"/>
+        <a:font script="Sinh" typeface="Iskoola Pota"/>
+        <a:font script="Mong" typeface="Mongolian Baiti"/>
+        <a:font script="Viet" typeface="Times New Roman"/>
+        <a:font script="Uigh" typeface="Microsoft Uighur"/>
+        <a:font script="Geor" typeface="Sylfaen"/>
+        <a:font script="Armn" typeface="Arial"/>
+        <a:font script="Bugi" typeface="Leelawadee UI"/>
+        <a:font script="Bopo" typeface="Microsoft JhengHei"/>
+        <a:font script="Java" typeface="Javanese Text"/>
+        <a:font script="Lisu" typeface="Segoe UI"/>
+        <a:font script="Mymr" typeface="Myanmar Text"/>
+        <a:font script="Nkoo" typeface="Ebrima"/>
+        <a:font script="Olck" typeface="Nirmala UI"/>
+        <a:font script="Osma" typeface="Ebrima"/>
+        <a:font script="Phag" typeface="Phagspa"/>
+        <a:font script="Syrn" typeface="Estrangelo Edessa"/>
+        <a:font script="Syrj" typeface="Estrangelo Edessa"/>
+        <a:font script="Syre" typeface="Estrangelo Edessa"/>
+        <a:font script="Sora" typeface="Nirmala UI"/>
+        <a:font script="Tale" typeface="Microsoft Tai Le"/>
+        <a:font script="Talu" typeface="Microsoft New Tai Lue"/>
+        <a:font script="Tfng" typeface="Ebrima"/>
+      </a:majorFont>
+      <a:minorFont>
+        <a:latin typeface="Calibri" panose="020F0502020204030204"/>
+        <a:ea typeface=""/>
+        <a:cs typeface=""/>
+        <a:font script="Jpan" typeface="游ゴシック"/>
+        <a:font script="Hang" typeface="맑은 고딕"/>
+        <a:font script="Hans" typeface="等线"/>
+        <a:font script="Hant" typeface="新細明體"/>
+        <a:font script="Arab" typeface="Arial"/>
+        <a:font script="Hebr" typeface="Arial"/>
+        <a:font script="Thai" typeface="Cordia New"/>
+        <a:font script="Ethi" typeface="Nyala"/>
+        <a:font script="Beng" typeface="Vrinda"/>
+        <a:font script="Gujr" typeface="Shruti"/>
+        <a:font script="Khmr" typeface="DaunPenh"/>
+        <a:font script="Knda" typeface="Tunga"/>
+        <a:font script="Guru" typeface="Raavi"/>
+        <a:font script="Cans" typeface="Euphemia"/>
+        <a:font script="Cher" typeface="Plantagenet Cherokee"/>
+        <a:font script="Yiii" typeface="Microsoft Yi Baiti"/>
+        <a:font script="Tibt" typeface="Microsoft Himalaya"/>
+        <a:font script="Thaa" typeface="MV Boli"/>
+        <a:font script="Deva" typeface="Mangal"/>
+        <a:font script="Telu" typeface="Gautami"/>
+        <a:font script="Taml" typeface="Latha"/>
+        <a:font script="Syrc" typeface="Estrangelo Edessa"/>
+        <a:font script="Orya" typeface="Kalinga"/>
+        <a:font script="Mlym" typeface="Kartika"/>
+        <a:font script="Laoo" typeface="DokChampa"/>
+        <a:font script="Sinh" typeface="Iskoola Pota"/>
+        <a:font script="Mong" typeface="Mongolian Baiti"/>
+        <a:font script="Viet" typeface="Arial"/>
+        <a:font script="Uigh" typeface="Microsoft Uighur"/>
+        <a:font script="Geor" typeface="Sylfaen"/>
+        <a:font script="Armn" typeface="Arial"/>
+        <a:font script="Bugi" typeface="Leelawadee UI"/>
+        <a:font script="Bopo" typeface="Microsoft JhengHei"/>
+        <a:font script="Java" typeface="Javanese Text"/>
+        <a:font script="Lisu" typeface="Segoe UI"/>
+        <a:font script="Mymr" typeface="Myanmar Text"/>
+        <a:font script="Nkoo" typeface="Ebrima"/>
+        <a:font script="Olck" typeface="Nirmala UI"/>
+        <a:font script="Osma" typeface="Ebrima"/>
+        <a:font script="Phag" typeface="Phagspa"/>
+        <a:font script="Syrn" typeface="Estrangelo Edessa"/>
+        <a:font script="Syrj" typeface="Estrangelo Edessa"/>
+        <a:font script="Syre" typeface="Estrangelo Edessa"/>
+        <a:font script="Sora" typeface="Nirmala UI"/>
+        <a:font script="Tale" typeface="Microsoft Tai Le"/>
+        <a:font script="Talu" typeface="Microsoft New Tai Lue"/>
+        <a:font script="Tfng" typeface="Ebrima"/>
+      </a:minorFont>
+    </a:fontScheme>
+    <a:fmtScheme name="Office">
+      <a:fillStyleLst>
+        <a:solidFill>
+          <a:schemeClr val="phClr"/>
+        </a:solidFill>
+        <a:gradFill rotWithShape="1">
+          <a:gsLst>
+            <a:gs pos="0">
+              <a:schemeClr val="phClr">
+                <a:lumMod val="110000"/>
+                <a:satMod val="105000"/>
+                <a:tint val="67000"/>
+              </a:schemeClr>
+            </a:gs>
+            <a:gs pos="50000">
+              <a:schemeClr val="phClr">
+                <a:lumMod val="105000"/>
+                <a:satMod val="103000"/>
+                <a:tint val="73000"/>
+              </a:schemeClr>
+            </a:gs>
+            <a:gs pos="100000">
+              <a:schemeClr val="phClr">
+                <a:lumMod val="105000"/>
+                <a:satMod val="109000"/>
+                <a:tint val="81000"/>
+              </a:schemeClr>
+            </a:gs>
+          </a:gsLst>
+          <a:lin ang="5400000" scaled="0"/>
+        </a:gradFill>
+        <a:gradFill rotWithShape="1">
+          <a:gsLst>
+            <a:gs pos="0">
+              <a:schemeClr val="phClr">
+                <a:satMod val="103000"/>
+                <a:lumMod val="102000"/>
+                <a:tint val="94000"/>
+              </a:schemeClr>
+            </a:gs>
+            <a:gs pos="50000">
+              <a:schemeClr val="phClr">
+                <a:satMod val="110000"/>
+                <a:lumMod val="100000"/>
+                <a:shade val="100000"/>
+              </a:schemeClr>
+            </a:gs>
+            <a:gs pos="100000">
+              <a:schemeClr val="phClr">
+                <a:lumMod val="99000"/>
+                <a:satMod val="120000"/>
+                <a:shade val="78000"/>
+              </a:schemeClr>
+            </a:gs>
+          </a:gsLst>
+          <a:lin ang="5400000" scaled="0"/>
+        </a:gradFill>
+      </a:fillStyleLst>
+      <a:lnStyleLst>
+        <a:ln w="6350" cap="flat" cmpd="sng" algn="ctr">
+          <a:solidFill>
+            <a:schemeClr val="phClr"/>
+          </a:solidFill>
+          <a:prstDash val="solid"/>
+          <a:miter lim="800000"/>
+        </a:ln>
+        <a:ln w="12700" cap="flat" cmpd="sng" algn="ctr">
+          <a:solidFill>
+            <a:schemeClr val="phClr"/>
+          </a:solidFill>
+          <a:prstDash val="solid"/>
+          <a:miter lim="800000"/>
+        </a:ln>
+        <a:ln w="19050" cap="flat" cmpd="sng" algn="ctr">
+          <a:solidFill>
+            <a:schemeClr val="phClr"/>
+          </a:solidFill>
+          <a:prstDash val="solid"/>
+          <a:miter lim="800000"/>
+        </a:ln>
+      </a:lnStyleLst>
+      <a:effectStyleLst>
+        <a:effectStyle>
+          <a:effectLst/>
+        </a:effectStyle>
+        <a:effectStyle>
+          <a:effectLst/>
+        </a:effectStyle>
+        <a:effectStyle>
+          <a:effectLst>
+            <a:outerShdw blurRad="57150" dist="19050" dir="5400000" algn="ctr" rotWithShape="0">
+              <a:srgbClr val="000000">
+                <a:alpha val="63000"/>
+              </a:srgbClr>
+            </a:outerShdw>
+          </a:effectLst>
+        </a:effectStyle>
+      </a:effectStyleLst>
+      <a:bgFillStyleLst>
+        <a:solidFill>
+          <a:schemeClr val="phClr"/>
+        </a:solidFill>
+        <a:solidFill>
+          <a:schemeClr val="phClr">
+            <a:tint val="95000"/>
+            <a:satMod val="170000"/>
+          </a:schemeClr>
+        </a:solidFill>
+        <a:gradFill rotWithShape="1">
+          <a:gsLst>
+            <a:gs pos="0">
+              <a:schemeClr val="phClr">
+                <a:tint val="93000"/>
+                <a:satMod val="150000"/>
+                <a:shade val="98000"/>
+                <a:lumMod val="102000"/>
+              </a:schemeClr>
+            </a:gs>
+            <a:gs pos="50000">
+              <a:schemeClr val="phClr">
+                <a:tint val="98000"/>
+                <a:satMod val="130000"/>
+                <a:shade val="90000"/>
+                <a:lumMod val="103000"/>
+              </a:schemeClr>
+            </a:gs>
+            <a:gs pos="100000">
+              <a:schemeClr val="phClr">
+                <a:shade val="63000"/>
+                <a:satMod val="120000"/>
+              </a:schemeClr>
+            </a:gs>
+          </a:gsLst>
+          <a:lin ang="5400000" scaled="0"/>
+        </a:gradFill>
+      </a:bgFillStyleLst>
+    </a:fmtScheme>
+  </a:themeElements>
+  <a:objectDefaults/>
+  <a:extraClrSchemeLst/>
+  <a:extLst>
+    <a:ext uri="{05A4C25C-085E-4340-85A3-A5531E510DB2}">
+      <thm15:themeFamily xmlns:thm15="http://schemas.microsoft.com/office/thememl/2012/main" name="Office Theme" id="{62F939B6-93AF-4DB8-9C6B-D6C7DFDC589F}" vid="{4A3C46E8-61CC-4603-A589-7422A47A8E4A}"/>
+    </a:ext>
+  </a:extLst>
+</a:theme>
 </file>
</xml_diff>